<commit_message>
c programming ii added
</commit_message>
<xml_diff>
--- a/assets/Computer_Science/Class_12/PHP_FULL.pptx
+++ b/assets/Computer_Science/Class_12/PHP_FULL.pptx
@@ -223,7 +223,7 @@
           <a:p>
             <a:fld id="{7358CC29-445E-4375-84FA-A1290C1DFF7E}" type="datetimeFigureOut">
               <a:rPr lang="en-US" smtClean="0"/>
-              <a:t>1/31/2023</a:t>
+              <a:t>2/1/2023</a:t>
             </a:fld>
             <a:endParaRPr lang="en-US"/>
           </a:p>
@@ -843,7 +843,7 @@
           <a:p>
             <a:fld id="{0653D66D-8F7F-4D89-96F6-686A96BDA468}" type="datetimeFigureOut">
               <a:rPr lang="en-US" smtClean="0"/>
-              <a:t>1/31/2023</a:t>
+              <a:t>2/1/2023</a:t>
             </a:fld>
             <a:endParaRPr lang="en-US"/>
           </a:p>
@@ -1141,7 +1141,7 @@
           <a:p>
             <a:fld id="{0653D66D-8F7F-4D89-96F6-686A96BDA468}" type="datetimeFigureOut">
               <a:rPr lang="en-US" smtClean="0"/>
-              <a:t>1/31/2023</a:t>
+              <a:t>2/1/2023</a:t>
             </a:fld>
             <a:endParaRPr lang="en-US"/>
           </a:p>
@@ -1333,7 +1333,7 @@
           <a:p>
             <a:fld id="{0653D66D-8F7F-4D89-96F6-686A96BDA468}" type="datetimeFigureOut">
               <a:rPr lang="en-US" smtClean="0"/>
-              <a:t>1/31/2023</a:t>
+              <a:t>2/1/2023</a:t>
             </a:fld>
             <a:endParaRPr lang="en-US"/>
           </a:p>
@@ -1594,7 +1594,7 @@
           <a:p>
             <a:fld id="{0653D66D-8F7F-4D89-96F6-686A96BDA468}" type="datetimeFigureOut">
               <a:rPr lang="en-US" smtClean="0"/>
-              <a:t>1/31/2023</a:t>
+              <a:t>2/1/2023</a:t>
             </a:fld>
             <a:endParaRPr lang="en-US"/>
           </a:p>
@@ -2018,7 +2018,7 @@
           <a:p>
             <a:fld id="{0653D66D-8F7F-4D89-96F6-686A96BDA468}" type="datetimeFigureOut">
               <a:rPr lang="en-US" smtClean="0"/>
-              <a:t>1/31/2023</a:t>
+              <a:t>2/1/2023</a:t>
             </a:fld>
             <a:endParaRPr lang="en-US"/>
           </a:p>
@@ -2555,7 +2555,7 @@
           <a:p>
             <a:fld id="{0653D66D-8F7F-4D89-96F6-686A96BDA468}" type="datetimeFigureOut">
               <a:rPr lang="en-US" smtClean="0"/>
-              <a:t>1/31/2023</a:t>
+              <a:t>2/1/2023</a:t>
             </a:fld>
             <a:endParaRPr lang="en-US"/>
           </a:p>
@@ -3419,7 +3419,7 @@
           <a:p>
             <a:fld id="{0653D66D-8F7F-4D89-96F6-686A96BDA468}" type="datetimeFigureOut">
               <a:rPr lang="en-US" smtClean="0"/>
-              <a:t>1/31/2023</a:t>
+              <a:t>2/1/2023</a:t>
             </a:fld>
             <a:endParaRPr lang="en-US"/>
           </a:p>
@@ -3589,7 +3589,7 @@
           <a:p>
             <a:fld id="{0653D66D-8F7F-4D89-96F6-686A96BDA468}" type="datetimeFigureOut">
               <a:rPr lang="en-US" smtClean="0"/>
-              <a:t>1/31/2023</a:t>
+              <a:t>2/1/2023</a:t>
             </a:fld>
             <a:endParaRPr lang="en-US"/>
           </a:p>
@@ -3773,7 +3773,7 @@
           <a:p>
             <a:fld id="{0653D66D-8F7F-4D89-96F6-686A96BDA468}" type="datetimeFigureOut">
               <a:rPr lang="en-US" smtClean="0"/>
-              <a:t>1/31/2023</a:t>
+              <a:t>2/1/2023</a:t>
             </a:fld>
             <a:endParaRPr lang="en-US"/>
           </a:p>
@@ -3943,7 +3943,7 @@
           <a:p>
             <a:fld id="{0653D66D-8F7F-4D89-96F6-686A96BDA468}" type="datetimeFigureOut">
               <a:rPr lang="en-US" smtClean="0"/>
-              <a:t>1/31/2023</a:t>
+              <a:t>2/1/2023</a:t>
             </a:fld>
             <a:endParaRPr lang="en-US"/>
           </a:p>
@@ -4187,7 +4187,7 @@
           <a:p>
             <a:fld id="{0653D66D-8F7F-4D89-96F6-686A96BDA468}" type="datetimeFigureOut">
               <a:rPr lang="en-US" smtClean="0"/>
-              <a:t>1/31/2023</a:t>
+              <a:t>2/1/2023</a:t>
             </a:fld>
             <a:endParaRPr lang="en-US"/>
           </a:p>
@@ -4423,7 +4423,7 @@
           <a:p>
             <a:fld id="{0653D66D-8F7F-4D89-96F6-686A96BDA468}" type="datetimeFigureOut">
               <a:rPr lang="en-US" smtClean="0"/>
-              <a:t>1/31/2023</a:t>
+              <a:t>2/1/2023</a:t>
             </a:fld>
             <a:endParaRPr lang="en-US"/>
           </a:p>
@@ -4889,7 +4889,7 @@
           <a:p>
             <a:fld id="{0653D66D-8F7F-4D89-96F6-686A96BDA468}" type="datetimeFigureOut">
               <a:rPr lang="en-US" smtClean="0"/>
-              <a:t>1/31/2023</a:t>
+              <a:t>2/1/2023</a:t>
             </a:fld>
             <a:endParaRPr lang="en-US"/>
           </a:p>
@@ -5007,7 +5007,7 @@
           <a:p>
             <a:fld id="{0653D66D-8F7F-4D89-96F6-686A96BDA468}" type="datetimeFigureOut">
               <a:rPr lang="en-US" smtClean="0"/>
-              <a:t>1/31/2023</a:t>
+              <a:t>2/1/2023</a:t>
             </a:fld>
             <a:endParaRPr lang="en-US"/>
           </a:p>
@@ -5102,7 +5102,7 @@
           <a:p>
             <a:fld id="{0653D66D-8F7F-4D89-96F6-686A96BDA468}" type="datetimeFigureOut">
               <a:rPr lang="en-US" smtClean="0"/>
-              <a:t>1/31/2023</a:t>
+              <a:t>2/1/2023</a:t>
             </a:fld>
             <a:endParaRPr lang="en-US"/>
           </a:p>
@@ -5357,7 +5357,7 @@
           <a:p>
             <a:fld id="{0653D66D-8F7F-4D89-96F6-686A96BDA468}" type="datetimeFigureOut">
               <a:rPr lang="en-US" smtClean="0"/>
-              <a:t>1/31/2023</a:t>
+              <a:t>2/1/2023</a:t>
             </a:fld>
             <a:endParaRPr lang="en-US"/>
           </a:p>
@@ -5657,7 +5657,7 @@
           <a:p>
             <a:fld id="{0653D66D-8F7F-4D89-96F6-686A96BDA468}" type="datetimeFigureOut">
               <a:rPr lang="en-US" smtClean="0"/>
-              <a:t>1/31/2023</a:t>
+              <a:t>2/1/2023</a:t>
             </a:fld>
             <a:endParaRPr lang="en-US"/>
           </a:p>
@@ -5891,7 +5891,7 @@
           <a:p>
             <a:fld id="{0653D66D-8F7F-4D89-96F6-686A96BDA468}" type="datetimeFigureOut">
               <a:rPr lang="en-US" smtClean="0"/>
-              <a:t>1/31/2023</a:t>
+              <a:t>2/1/2023</a:t>
             </a:fld>
             <a:endParaRPr lang="en-US"/>
           </a:p>

</xml_diff>

<commit_message>
pdf files added to be available to download
</commit_message>
<xml_diff>
--- a/assets/Computer_Science/Class_12/PHP_FULL.pptx
+++ b/assets/Computer_Science/Class_12/PHP_FULL.pptx
@@ -141,6 +141,3106 @@
 </p:presentation>
 </file>
 
+<file path=ppt/diagrams/colors1.xml><?xml version="1.0" encoding="utf-8"?>
+<dgm:colorsDef xmlns:dgm="http://schemas.openxmlformats.org/drawingml/2006/diagram" xmlns:a="http://schemas.openxmlformats.org/drawingml/2006/main" uniqueId="urn:microsoft.com/office/officeart/2005/8/colors/colorful2">
+  <dgm:title val=""/>
+  <dgm:desc val=""/>
+  <dgm:catLst>
+    <dgm:cat type="colorful" pri="10200"/>
+  </dgm:catLst>
+  <dgm:styleLbl name="node0">
+    <dgm:fillClrLst meth="repeat">
+      <a:schemeClr val="accent1"/>
+    </dgm:fillClrLst>
+    <dgm:linClrLst meth="repeat">
+      <a:schemeClr val="lt1"/>
+    </dgm:linClrLst>
+    <dgm:effectClrLst/>
+    <dgm:txLinClrLst/>
+    <dgm:txFillClrLst/>
+    <dgm:txEffectClrLst/>
+  </dgm:styleLbl>
+  <dgm:styleLbl name="node1">
+    <dgm:fillClrLst>
+      <a:schemeClr val="accent2"/>
+      <a:schemeClr val="accent3"/>
+    </dgm:fillClrLst>
+    <dgm:linClrLst meth="repeat">
+      <a:schemeClr val="lt1"/>
+    </dgm:linClrLst>
+    <dgm:effectClrLst/>
+    <dgm:txLinClrLst/>
+    <dgm:txFillClrLst/>
+    <dgm:txEffectClrLst/>
+  </dgm:styleLbl>
+  <dgm:styleLbl name="alignNode1">
+    <dgm:fillClrLst>
+      <a:schemeClr val="accent2"/>
+      <a:schemeClr val="accent3"/>
+    </dgm:fillClrLst>
+    <dgm:linClrLst>
+      <a:schemeClr val="accent2"/>
+      <a:schemeClr val="accent3"/>
+    </dgm:linClrLst>
+    <dgm:effectClrLst/>
+    <dgm:txLinClrLst/>
+    <dgm:txFillClrLst/>
+    <dgm:txEffectClrLst/>
+  </dgm:styleLbl>
+  <dgm:styleLbl name="lnNode1">
+    <dgm:fillClrLst>
+      <a:schemeClr val="accent2"/>
+      <a:schemeClr val="accent3"/>
+    </dgm:fillClrLst>
+    <dgm:linClrLst meth="repeat">
+      <a:schemeClr val="lt1"/>
+    </dgm:linClrLst>
+    <dgm:effectClrLst/>
+    <dgm:txLinClrLst/>
+    <dgm:txFillClrLst/>
+    <dgm:txEffectClrLst/>
+  </dgm:styleLbl>
+  <dgm:styleLbl name="vennNode1">
+    <dgm:fillClrLst>
+      <a:schemeClr val="accent2">
+        <a:alpha val="50000"/>
+      </a:schemeClr>
+      <a:schemeClr val="accent3">
+        <a:alpha val="50000"/>
+      </a:schemeClr>
+    </dgm:fillClrLst>
+    <dgm:linClrLst meth="repeat">
+      <a:schemeClr val="lt1"/>
+    </dgm:linClrLst>
+    <dgm:effectClrLst/>
+    <dgm:txLinClrLst/>
+    <dgm:txFillClrLst/>
+    <dgm:txEffectClrLst/>
+  </dgm:styleLbl>
+  <dgm:styleLbl name="node2">
+    <dgm:fillClrLst>
+      <a:schemeClr val="accent3"/>
+    </dgm:fillClrLst>
+    <dgm:linClrLst meth="repeat">
+      <a:schemeClr val="lt1"/>
+    </dgm:linClrLst>
+    <dgm:effectClrLst/>
+    <dgm:txLinClrLst/>
+    <dgm:txFillClrLst/>
+    <dgm:txEffectClrLst/>
+  </dgm:styleLbl>
+  <dgm:styleLbl name="node3">
+    <dgm:fillClrLst>
+      <a:schemeClr val="accent4"/>
+    </dgm:fillClrLst>
+    <dgm:linClrLst meth="repeat">
+      <a:schemeClr val="lt1"/>
+    </dgm:linClrLst>
+    <dgm:effectClrLst/>
+    <dgm:txLinClrLst/>
+    <dgm:txFillClrLst/>
+    <dgm:txEffectClrLst/>
+  </dgm:styleLbl>
+  <dgm:styleLbl name="node4">
+    <dgm:fillClrLst>
+      <a:schemeClr val="accent5"/>
+    </dgm:fillClrLst>
+    <dgm:linClrLst meth="repeat">
+      <a:schemeClr val="lt1"/>
+    </dgm:linClrLst>
+    <dgm:effectClrLst/>
+    <dgm:txLinClrLst/>
+    <dgm:txFillClrLst/>
+    <dgm:txEffectClrLst/>
+  </dgm:styleLbl>
+  <dgm:styleLbl name="fgImgPlace1">
+    <dgm:fillClrLst>
+      <a:schemeClr val="accent2">
+        <a:tint val="50000"/>
+      </a:schemeClr>
+      <a:schemeClr val="accent3">
+        <a:tint val="50000"/>
+      </a:schemeClr>
+    </dgm:fillClrLst>
+    <dgm:linClrLst meth="repeat">
+      <a:schemeClr val="lt1"/>
+    </dgm:linClrLst>
+    <dgm:effectClrLst/>
+    <dgm:txLinClrLst/>
+    <dgm:txFillClrLst meth="repeat">
+      <a:schemeClr val="lt1"/>
+    </dgm:txFillClrLst>
+    <dgm:txEffectClrLst/>
+  </dgm:styleLbl>
+  <dgm:styleLbl name="alignImgPlace1">
+    <dgm:fillClrLst>
+      <a:schemeClr val="accent2">
+        <a:tint val="50000"/>
+      </a:schemeClr>
+      <a:schemeClr val="accent3">
+        <a:tint val="20000"/>
+      </a:schemeClr>
+    </dgm:fillClrLst>
+    <dgm:linClrLst meth="repeat">
+      <a:schemeClr val="lt1"/>
+    </dgm:linClrLst>
+    <dgm:effectClrLst/>
+    <dgm:txLinClrLst/>
+    <dgm:txFillClrLst meth="repeat">
+      <a:schemeClr val="lt1"/>
+    </dgm:txFillClrLst>
+    <dgm:txEffectClrLst/>
+  </dgm:styleLbl>
+  <dgm:styleLbl name="bgImgPlace1">
+    <dgm:fillClrLst>
+      <a:schemeClr val="accent2">
+        <a:tint val="50000"/>
+      </a:schemeClr>
+      <a:schemeClr val="accent3">
+        <a:tint val="20000"/>
+      </a:schemeClr>
+    </dgm:fillClrLst>
+    <dgm:linClrLst meth="repeat">
+      <a:schemeClr val="lt1"/>
+    </dgm:linClrLst>
+    <dgm:effectClrLst/>
+    <dgm:txLinClrLst/>
+    <dgm:txFillClrLst meth="repeat">
+      <a:schemeClr val="lt1"/>
+    </dgm:txFillClrLst>
+    <dgm:txEffectClrLst/>
+  </dgm:styleLbl>
+  <dgm:styleLbl name="sibTrans2D1">
+    <dgm:fillClrLst>
+      <a:schemeClr val="accent2"/>
+      <a:schemeClr val="accent3"/>
+    </dgm:fillClrLst>
+    <dgm:linClrLst meth="repeat">
+      <a:schemeClr val="lt1"/>
+    </dgm:linClrLst>
+    <dgm:effectClrLst/>
+    <dgm:txLinClrLst/>
+    <dgm:txFillClrLst/>
+    <dgm:txEffectClrLst/>
+  </dgm:styleLbl>
+  <dgm:styleLbl name="fgSibTrans2D1">
+    <dgm:fillClrLst>
+      <a:schemeClr val="accent2"/>
+      <a:schemeClr val="accent3"/>
+    </dgm:fillClrLst>
+    <dgm:linClrLst meth="repeat">
+      <a:schemeClr val="lt1"/>
+    </dgm:linClrLst>
+    <dgm:effectClrLst/>
+    <dgm:txLinClrLst/>
+    <dgm:txFillClrLst meth="repeat">
+      <a:schemeClr val="lt1"/>
+    </dgm:txFillClrLst>
+    <dgm:txEffectClrLst/>
+  </dgm:styleLbl>
+  <dgm:styleLbl name="bgSibTrans2D1">
+    <dgm:fillClrLst>
+      <a:schemeClr val="accent2"/>
+      <a:schemeClr val="accent3"/>
+    </dgm:fillClrLst>
+    <dgm:linClrLst meth="repeat">
+      <a:schemeClr val="lt1"/>
+    </dgm:linClrLst>
+    <dgm:effectClrLst/>
+    <dgm:txLinClrLst/>
+    <dgm:txFillClrLst meth="repeat">
+      <a:schemeClr val="lt1"/>
+    </dgm:txFillClrLst>
+    <dgm:txEffectClrLst/>
+  </dgm:styleLbl>
+  <dgm:styleLbl name="sibTrans1D1">
+    <dgm:fillClrLst/>
+    <dgm:linClrLst>
+      <a:schemeClr val="accent2"/>
+      <a:schemeClr val="accent3"/>
+    </dgm:linClrLst>
+    <dgm:effectClrLst/>
+    <dgm:txLinClrLst/>
+    <dgm:txFillClrLst meth="repeat">
+      <a:schemeClr val="tx1"/>
+    </dgm:txFillClrLst>
+    <dgm:txEffectClrLst/>
+  </dgm:styleLbl>
+  <dgm:styleLbl name="callout">
+    <dgm:fillClrLst meth="repeat">
+      <a:schemeClr val="accent2"/>
+    </dgm:fillClrLst>
+    <dgm:linClrLst meth="repeat">
+      <a:schemeClr val="accent2">
+        <a:tint val="50000"/>
+      </a:schemeClr>
+    </dgm:linClrLst>
+    <dgm:effectClrLst/>
+    <dgm:txLinClrLst/>
+    <dgm:txFillClrLst meth="repeat">
+      <a:schemeClr val="tx1"/>
+    </dgm:txFillClrLst>
+    <dgm:txEffectClrLst/>
+  </dgm:styleLbl>
+  <dgm:styleLbl name="asst0">
+    <dgm:fillClrLst meth="repeat">
+      <a:schemeClr val="accent2"/>
+    </dgm:fillClrLst>
+    <dgm:linClrLst meth="repeat">
+      <a:schemeClr val="lt1">
+        <a:shade val="80000"/>
+      </a:schemeClr>
+    </dgm:linClrLst>
+    <dgm:effectClrLst/>
+    <dgm:txLinClrLst/>
+    <dgm:txFillClrLst/>
+    <dgm:txEffectClrLst/>
+  </dgm:styleLbl>
+  <dgm:styleLbl name="asst1">
+    <dgm:fillClrLst meth="repeat">
+      <a:schemeClr val="accent3"/>
+    </dgm:fillClrLst>
+    <dgm:linClrLst meth="repeat">
+      <a:schemeClr val="lt1">
+        <a:shade val="80000"/>
+      </a:schemeClr>
+    </dgm:linClrLst>
+    <dgm:effectClrLst/>
+    <dgm:txLinClrLst/>
+    <dgm:txFillClrLst/>
+    <dgm:txEffectClrLst/>
+  </dgm:styleLbl>
+  <dgm:styleLbl name="asst2">
+    <dgm:fillClrLst>
+      <a:schemeClr val="accent4"/>
+    </dgm:fillClrLst>
+    <dgm:linClrLst meth="repeat">
+      <a:schemeClr val="lt1"/>
+    </dgm:linClrLst>
+    <dgm:effectClrLst/>
+    <dgm:txLinClrLst/>
+    <dgm:txFillClrLst/>
+    <dgm:txEffectClrLst/>
+  </dgm:styleLbl>
+  <dgm:styleLbl name="asst3">
+    <dgm:fillClrLst>
+      <a:schemeClr val="accent5"/>
+    </dgm:fillClrLst>
+    <dgm:linClrLst meth="repeat">
+      <a:schemeClr val="lt1"/>
+    </dgm:linClrLst>
+    <dgm:effectClrLst/>
+    <dgm:txLinClrLst/>
+    <dgm:txFillClrLst/>
+    <dgm:txEffectClrLst/>
+  </dgm:styleLbl>
+  <dgm:styleLbl name="asst4">
+    <dgm:fillClrLst>
+      <a:schemeClr val="accent6"/>
+    </dgm:fillClrLst>
+    <dgm:linClrLst meth="repeat">
+      <a:schemeClr val="lt1"/>
+    </dgm:linClrLst>
+    <dgm:effectClrLst/>
+    <dgm:txLinClrLst/>
+    <dgm:txFillClrLst/>
+    <dgm:txEffectClrLst/>
+  </dgm:styleLbl>
+  <dgm:styleLbl name="parChTrans2D1">
+    <dgm:fillClrLst meth="repeat">
+      <a:schemeClr val="accent2"/>
+    </dgm:fillClrLst>
+    <dgm:linClrLst meth="repeat">
+      <a:schemeClr val="lt1"/>
+    </dgm:linClrLst>
+    <dgm:effectClrLst/>
+    <dgm:txLinClrLst/>
+    <dgm:txFillClrLst meth="repeat">
+      <a:schemeClr val="lt1"/>
+    </dgm:txFillClrLst>
+    <dgm:txEffectClrLst/>
+  </dgm:styleLbl>
+  <dgm:styleLbl name="parChTrans2D2">
+    <dgm:fillClrLst meth="repeat">
+      <a:schemeClr val="accent3"/>
+    </dgm:fillClrLst>
+    <dgm:linClrLst meth="repeat">
+      <a:schemeClr val="lt1"/>
+    </dgm:linClrLst>
+    <dgm:effectClrLst/>
+    <dgm:txLinClrLst/>
+    <dgm:txFillClrLst/>
+    <dgm:txEffectClrLst/>
+  </dgm:styleLbl>
+  <dgm:styleLbl name="parChTrans2D3">
+    <dgm:fillClrLst meth="repeat">
+      <a:schemeClr val="accent4"/>
+    </dgm:fillClrLst>
+    <dgm:linClrLst meth="repeat">
+      <a:schemeClr val="lt1"/>
+    </dgm:linClrLst>
+    <dgm:effectClrLst/>
+    <dgm:txLinClrLst/>
+    <dgm:txFillClrLst/>
+    <dgm:txEffectClrLst/>
+  </dgm:styleLbl>
+  <dgm:styleLbl name="parChTrans2D4">
+    <dgm:fillClrLst meth="repeat">
+      <a:schemeClr val="accent5"/>
+    </dgm:fillClrLst>
+    <dgm:linClrLst meth="repeat">
+      <a:schemeClr val="lt1"/>
+    </dgm:linClrLst>
+    <dgm:effectClrLst/>
+    <dgm:txLinClrLst/>
+    <dgm:txFillClrLst meth="repeat">
+      <a:schemeClr val="lt1"/>
+    </dgm:txFillClrLst>
+    <dgm:txEffectClrLst/>
+  </dgm:styleLbl>
+  <dgm:styleLbl name="parChTrans1D1">
+    <dgm:fillClrLst meth="repeat">
+      <a:schemeClr val="accent2"/>
+    </dgm:fillClrLst>
+    <dgm:linClrLst meth="repeat">
+      <a:schemeClr val="accent2"/>
+    </dgm:linClrLst>
+    <dgm:effectClrLst/>
+    <dgm:txLinClrLst/>
+    <dgm:txFillClrLst meth="repeat">
+      <a:schemeClr val="tx1"/>
+    </dgm:txFillClrLst>
+    <dgm:txEffectClrLst/>
+  </dgm:styleLbl>
+  <dgm:styleLbl name="parChTrans1D2">
+    <dgm:fillClrLst meth="repeat">
+      <a:schemeClr val="accent2">
+        <a:tint val="90000"/>
+      </a:schemeClr>
+    </dgm:fillClrLst>
+    <dgm:linClrLst meth="repeat">
+      <a:schemeClr val="accent3"/>
+    </dgm:linClrLst>
+    <dgm:effectClrLst/>
+    <dgm:txLinClrLst/>
+    <dgm:txFillClrLst meth="repeat">
+      <a:schemeClr val="tx1"/>
+    </dgm:txFillClrLst>
+    <dgm:txEffectClrLst/>
+  </dgm:styleLbl>
+  <dgm:styleLbl name="parChTrans1D3">
+    <dgm:fillClrLst meth="repeat">
+      <a:schemeClr val="accent2">
+        <a:tint val="70000"/>
+      </a:schemeClr>
+    </dgm:fillClrLst>
+    <dgm:linClrLst meth="repeat">
+      <a:schemeClr val="accent4"/>
+    </dgm:linClrLst>
+    <dgm:effectClrLst/>
+    <dgm:txLinClrLst/>
+    <dgm:txFillClrLst meth="repeat">
+      <a:schemeClr val="tx1"/>
+    </dgm:txFillClrLst>
+    <dgm:txEffectClrLst/>
+  </dgm:styleLbl>
+  <dgm:styleLbl name="parChTrans1D4">
+    <dgm:fillClrLst meth="repeat">
+      <a:schemeClr val="accent2">
+        <a:tint val="50000"/>
+      </a:schemeClr>
+    </dgm:fillClrLst>
+    <dgm:linClrLst meth="repeat">
+      <a:schemeClr val="accent5"/>
+    </dgm:linClrLst>
+    <dgm:effectClrLst/>
+    <dgm:txLinClrLst/>
+    <dgm:txFillClrLst meth="repeat">
+      <a:schemeClr val="tx1"/>
+    </dgm:txFillClrLst>
+    <dgm:txEffectClrLst/>
+  </dgm:styleLbl>
+  <dgm:styleLbl name="fgAcc1">
+    <dgm:fillClrLst meth="repeat">
+      <a:schemeClr val="lt1">
+        <a:alpha val="90000"/>
+      </a:schemeClr>
+    </dgm:fillClrLst>
+    <dgm:linClrLst>
+      <a:schemeClr val="accent2"/>
+      <a:schemeClr val="accent3"/>
+    </dgm:linClrLst>
+    <dgm:effectClrLst/>
+    <dgm:txLinClrLst/>
+    <dgm:txFillClrLst meth="repeat">
+      <a:schemeClr val="dk1"/>
+    </dgm:txFillClrLst>
+    <dgm:txEffectClrLst/>
+  </dgm:styleLbl>
+  <dgm:styleLbl name="conFgAcc1">
+    <dgm:fillClrLst meth="repeat">
+      <a:schemeClr val="lt1">
+        <a:alpha val="90000"/>
+      </a:schemeClr>
+    </dgm:fillClrLst>
+    <dgm:linClrLst>
+      <a:schemeClr val="accent2"/>
+      <a:schemeClr val="accent3"/>
+    </dgm:linClrLst>
+    <dgm:effectClrLst/>
+    <dgm:txLinClrLst/>
+    <dgm:txFillClrLst meth="repeat">
+      <a:schemeClr val="dk1"/>
+    </dgm:txFillClrLst>
+    <dgm:txEffectClrLst/>
+  </dgm:styleLbl>
+  <dgm:styleLbl name="alignAcc1">
+    <dgm:fillClrLst meth="repeat">
+      <a:schemeClr val="lt1">
+        <a:alpha val="90000"/>
+      </a:schemeClr>
+    </dgm:fillClrLst>
+    <dgm:linClrLst>
+      <a:schemeClr val="accent2"/>
+      <a:schemeClr val="accent3"/>
+    </dgm:linClrLst>
+    <dgm:effectClrLst/>
+    <dgm:txLinClrLst/>
+    <dgm:txFillClrLst meth="repeat">
+      <a:schemeClr val="dk1"/>
+    </dgm:txFillClrLst>
+    <dgm:txEffectClrLst/>
+  </dgm:styleLbl>
+  <dgm:styleLbl name="trAlignAcc1">
+    <dgm:fillClrLst meth="repeat">
+      <a:schemeClr val="lt1">
+        <a:alpha val="40000"/>
+      </a:schemeClr>
+    </dgm:fillClrLst>
+    <dgm:linClrLst meth="repeat">
+      <a:schemeClr val="accent2"/>
+    </dgm:linClrLst>
+    <dgm:effectClrLst/>
+    <dgm:txLinClrLst/>
+    <dgm:txFillClrLst meth="repeat">
+      <a:schemeClr val="dk1"/>
+    </dgm:txFillClrLst>
+    <dgm:txEffectClrLst/>
+  </dgm:styleLbl>
+  <dgm:styleLbl name="bgAcc1">
+    <dgm:fillClrLst meth="repeat">
+      <a:schemeClr val="lt1">
+        <a:alpha val="90000"/>
+      </a:schemeClr>
+    </dgm:fillClrLst>
+    <dgm:linClrLst>
+      <a:schemeClr val="accent2"/>
+      <a:schemeClr val="accent3"/>
+    </dgm:linClrLst>
+    <dgm:effectClrLst/>
+    <dgm:txLinClrLst/>
+    <dgm:txFillClrLst meth="repeat">
+      <a:schemeClr val="dk1"/>
+    </dgm:txFillClrLst>
+    <dgm:txEffectClrLst/>
+  </dgm:styleLbl>
+  <dgm:styleLbl name="solidFgAcc1">
+    <dgm:fillClrLst meth="repeat">
+      <a:schemeClr val="lt1"/>
+    </dgm:fillClrLst>
+    <dgm:linClrLst>
+      <a:schemeClr val="accent2"/>
+      <a:schemeClr val="accent3"/>
+    </dgm:linClrLst>
+    <dgm:effectClrLst/>
+    <dgm:txLinClrLst/>
+    <dgm:txFillClrLst meth="repeat">
+      <a:schemeClr val="dk1"/>
+    </dgm:txFillClrLst>
+    <dgm:txEffectClrLst/>
+  </dgm:styleLbl>
+  <dgm:styleLbl name="solidAlignAcc1">
+    <dgm:fillClrLst meth="repeat">
+      <a:schemeClr val="lt1"/>
+    </dgm:fillClrLst>
+    <dgm:linClrLst>
+      <a:schemeClr val="accent2"/>
+      <a:schemeClr val="accent3"/>
+    </dgm:linClrLst>
+    <dgm:effectClrLst/>
+    <dgm:txLinClrLst/>
+    <dgm:txFillClrLst meth="repeat">
+      <a:schemeClr val="dk1"/>
+    </dgm:txFillClrLst>
+    <dgm:txEffectClrLst/>
+  </dgm:styleLbl>
+  <dgm:styleLbl name="solidBgAcc1">
+    <dgm:fillClrLst meth="repeat">
+      <a:schemeClr val="lt1"/>
+    </dgm:fillClrLst>
+    <dgm:linClrLst>
+      <a:schemeClr val="accent2"/>
+      <a:schemeClr val="accent3"/>
+    </dgm:linClrLst>
+    <dgm:effectClrLst/>
+    <dgm:txLinClrLst/>
+    <dgm:txFillClrLst meth="repeat">
+      <a:schemeClr val="dk1"/>
+    </dgm:txFillClrLst>
+    <dgm:txEffectClrLst/>
+  </dgm:styleLbl>
+  <dgm:styleLbl name="fgAccFollowNode1">
+    <dgm:fillClrLst>
+      <a:schemeClr val="accent2">
+        <a:tint val="40000"/>
+        <a:alpha val="90000"/>
+      </a:schemeClr>
+      <a:schemeClr val="accent3">
+        <a:tint val="40000"/>
+        <a:alpha val="90000"/>
+      </a:schemeClr>
+    </dgm:fillClrLst>
+    <dgm:linClrLst>
+      <a:schemeClr val="accent2">
+        <a:tint val="40000"/>
+        <a:alpha val="90000"/>
+      </a:schemeClr>
+      <a:schemeClr val="accent3">
+        <a:tint val="40000"/>
+        <a:alpha val="90000"/>
+      </a:schemeClr>
+    </dgm:linClrLst>
+    <dgm:effectClrLst/>
+    <dgm:txLinClrLst/>
+    <dgm:txFillClrLst meth="repeat">
+      <a:schemeClr val="dk1"/>
+    </dgm:txFillClrLst>
+    <dgm:txEffectClrLst/>
+  </dgm:styleLbl>
+  <dgm:styleLbl name="alignAccFollowNode1">
+    <dgm:fillClrLst>
+      <a:schemeClr val="accent2">
+        <a:tint val="40000"/>
+        <a:alpha val="90000"/>
+      </a:schemeClr>
+      <a:schemeClr val="accent3">
+        <a:tint val="40000"/>
+        <a:alpha val="90000"/>
+      </a:schemeClr>
+    </dgm:fillClrLst>
+    <dgm:linClrLst>
+      <a:schemeClr val="accent2">
+        <a:tint val="40000"/>
+        <a:alpha val="90000"/>
+      </a:schemeClr>
+      <a:schemeClr val="accent3">
+        <a:tint val="40000"/>
+        <a:alpha val="90000"/>
+      </a:schemeClr>
+    </dgm:linClrLst>
+    <dgm:effectClrLst/>
+    <dgm:txLinClrLst/>
+    <dgm:txFillClrLst meth="repeat">
+      <a:schemeClr val="dk1"/>
+    </dgm:txFillClrLst>
+    <dgm:txEffectClrLst/>
+  </dgm:styleLbl>
+  <dgm:styleLbl name="bgAccFollowNode1">
+    <dgm:fillClrLst>
+      <a:schemeClr val="accent2">
+        <a:tint val="40000"/>
+        <a:alpha val="90000"/>
+      </a:schemeClr>
+      <a:schemeClr val="accent3">
+        <a:tint val="40000"/>
+        <a:alpha val="90000"/>
+      </a:schemeClr>
+    </dgm:fillClrLst>
+    <dgm:linClrLst>
+      <a:schemeClr val="accent2">
+        <a:tint val="40000"/>
+        <a:alpha val="90000"/>
+      </a:schemeClr>
+      <a:schemeClr val="accent3">
+        <a:tint val="40000"/>
+        <a:alpha val="90000"/>
+      </a:schemeClr>
+    </dgm:linClrLst>
+    <dgm:effectClrLst/>
+    <dgm:txLinClrLst/>
+    <dgm:txFillClrLst meth="repeat">
+      <a:schemeClr val="dk1"/>
+    </dgm:txFillClrLst>
+    <dgm:txEffectClrLst/>
+  </dgm:styleLbl>
+  <dgm:styleLbl name="fgAcc0">
+    <dgm:fillClrLst meth="repeat">
+      <a:schemeClr val="lt1">
+        <a:alpha val="90000"/>
+      </a:schemeClr>
+    </dgm:fillClrLst>
+    <dgm:linClrLst>
+      <a:schemeClr val="accent1"/>
+    </dgm:linClrLst>
+    <dgm:effectClrLst/>
+    <dgm:txLinClrLst/>
+    <dgm:txFillClrLst meth="repeat">
+      <a:schemeClr val="dk1"/>
+    </dgm:txFillClrLst>
+    <dgm:txEffectClrLst/>
+  </dgm:styleLbl>
+  <dgm:styleLbl name="fgAcc2">
+    <dgm:fillClrLst meth="repeat">
+      <a:schemeClr val="lt1">
+        <a:alpha val="90000"/>
+      </a:schemeClr>
+    </dgm:fillClrLst>
+    <dgm:linClrLst>
+      <a:schemeClr val="accent3"/>
+    </dgm:linClrLst>
+    <dgm:effectClrLst/>
+    <dgm:txLinClrLst/>
+    <dgm:txFillClrLst meth="repeat">
+      <a:schemeClr val="dk1"/>
+    </dgm:txFillClrLst>
+    <dgm:txEffectClrLst/>
+  </dgm:styleLbl>
+  <dgm:styleLbl name="fgAcc3">
+    <dgm:fillClrLst meth="repeat">
+      <a:schemeClr val="lt1">
+        <a:alpha val="90000"/>
+      </a:schemeClr>
+    </dgm:fillClrLst>
+    <dgm:linClrLst>
+      <a:schemeClr val="accent4"/>
+    </dgm:linClrLst>
+    <dgm:effectClrLst/>
+    <dgm:txLinClrLst/>
+    <dgm:txFillClrLst meth="repeat">
+      <a:schemeClr val="dk1"/>
+    </dgm:txFillClrLst>
+    <dgm:txEffectClrLst/>
+  </dgm:styleLbl>
+  <dgm:styleLbl name="fgAcc4">
+    <dgm:fillClrLst meth="repeat">
+      <a:schemeClr val="lt1">
+        <a:alpha val="90000"/>
+      </a:schemeClr>
+    </dgm:fillClrLst>
+    <dgm:linClrLst>
+      <a:schemeClr val="accent5"/>
+    </dgm:linClrLst>
+    <dgm:effectClrLst/>
+    <dgm:txLinClrLst/>
+    <dgm:txFillClrLst meth="repeat">
+      <a:schemeClr val="dk1"/>
+    </dgm:txFillClrLst>
+    <dgm:txEffectClrLst/>
+  </dgm:styleLbl>
+  <dgm:styleLbl name="bgShp">
+    <dgm:fillClrLst meth="repeat">
+      <a:schemeClr val="accent2">
+        <a:tint val="40000"/>
+      </a:schemeClr>
+    </dgm:fillClrLst>
+    <dgm:linClrLst meth="repeat">
+      <a:schemeClr val="dk1"/>
+    </dgm:linClrLst>
+    <dgm:effectClrLst/>
+    <dgm:txLinClrLst/>
+    <dgm:txFillClrLst meth="repeat">
+      <a:schemeClr val="dk1"/>
+    </dgm:txFillClrLst>
+    <dgm:txEffectClrLst/>
+  </dgm:styleLbl>
+  <dgm:styleLbl name="dkBgShp">
+    <dgm:fillClrLst meth="repeat">
+      <a:schemeClr val="accent2">
+        <a:shade val="90000"/>
+      </a:schemeClr>
+    </dgm:fillClrLst>
+    <dgm:linClrLst meth="repeat">
+      <a:schemeClr val="dk1"/>
+    </dgm:linClrLst>
+    <dgm:effectClrLst/>
+    <dgm:txLinClrLst/>
+    <dgm:txFillClrLst meth="repeat">
+      <a:schemeClr val="lt1"/>
+    </dgm:txFillClrLst>
+    <dgm:txEffectClrLst/>
+  </dgm:styleLbl>
+  <dgm:styleLbl name="trBgShp">
+    <dgm:fillClrLst meth="repeat">
+      <a:schemeClr val="accent2">
+        <a:tint val="50000"/>
+        <a:alpha val="40000"/>
+      </a:schemeClr>
+    </dgm:fillClrLst>
+    <dgm:linClrLst meth="repeat">
+      <a:schemeClr val="accent2"/>
+    </dgm:linClrLst>
+    <dgm:effectClrLst/>
+    <dgm:txLinClrLst/>
+    <dgm:txFillClrLst meth="repeat">
+      <a:schemeClr val="lt1"/>
+    </dgm:txFillClrLst>
+    <dgm:txEffectClrLst/>
+  </dgm:styleLbl>
+  <dgm:styleLbl name="fgShp">
+    <dgm:fillClrLst meth="repeat">
+      <a:schemeClr val="accent2">
+        <a:tint val="40000"/>
+      </a:schemeClr>
+    </dgm:fillClrLst>
+    <dgm:linClrLst meth="repeat">
+      <a:schemeClr val="lt1"/>
+    </dgm:linClrLst>
+    <dgm:effectClrLst/>
+    <dgm:txLinClrLst/>
+    <dgm:txFillClrLst meth="repeat">
+      <a:schemeClr val="dk1"/>
+    </dgm:txFillClrLst>
+    <dgm:txEffectClrLst/>
+  </dgm:styleLbl>
+  <dgm:styleLbl name="revTx">
+    <dgm:fillClrLst meth="repeat">
+      <a:schemeClr val="lt1">
+        <a:alpha val="0"/>
+      </a:schemeClr>
+    </dgm:fillClrLst>
+    <dgm:linClrLst meth="repeat">
+      <a:schemeClr val="dk1">
+        <a:alpha val="0"/>
+      </a:schemeClr>
+    </dgm:linClrLst>
+    <dgm:effectClrLst/>
+    <dgm:txLinClrLst/>
+    <dgm:txFillClrLst meth="repeat">
+      <a:schemeClr val="tx1"/>
+    </dgm:txFillClrLst>
+    <dgm:txEffectClrLst/>
+  </dgm:styleLbl>
+</dgm:colorsDef>
+</file>
+
+<file path=ppt/diagrams/data1.xml><?xml version="1.0" encoding="utf-8"?>
+<dgm:dataModel xmlns:dgm="http://schemas.openxmlformats.org/drawingml/2006/diagram" xmlns:a="http://schemas.openxmlformats.org/drawingml/2006/main">
+  <dgm:ptLst>
+    <dgm:pt modelId="{4C96270C-07C3-456C-AA5F-EB7A25780EED}" type="doc">
+      <dgm:prSet loTypeId="urn:microsoft.com/office/officeart/2008/layout/LinedList" loCatId="list" qsTypeId="urn:microsoft.com/office/officeart/2005/8/quickstyle/simple4" qsCatId="simple" csTypeId="urn:microsoft.com/office/officeart/2005/8/colors/colorful2" csCatId="colorful"/>
+      <dgm:spPr/>
+      <dgm:t>
+        <a:bodyPr/>
+        <a:lstStyle/>
+        <a:p>
+          <a:endParaRPr lang="en-US"/>
+        </a:p>
+      </dgm:t>
+    </dgm:pt>
+    <dgm:pt modelId="{E789E642-6918-44F1-AB61-168353D84B48}">
+      <dgm:prSet/>
+      <dgm:spPr/>
+      <dgm:t>
+        <a:bodyPr/>
+        <a:lstStyle/>
+        <a:p>
+          <a:r>
+            <a:rPr lang="en-US" b="0" i="0"/>
+            <a:t>PHP stands for Hypertext Preprocessor</a:t>
+          </a:r>
+          <a:endParaRPr lang="en-US"/>
+        </a:p>
+      </dgm:t>
+    </dgm:pt>
+    <dgm:pt modelId="{17330C4D-BE77-4973-A403-E724874D2524}" type="parTrans" cxnId="{8A55F8B5-8101-4DE2-9A58-3CD676B73192}">
+      <dgm:prSet/>
+      <dgm:spPr/>
+      <dgm:t>
+        <a:bodyPr/>
+        <a:lstStyle/>
+        <a:p>
+          <a:endParaRPr lang="en-US"/>
+        </a:p>
+      </dgm:t>
+    </dgm:pt>
+    <dgm:pt modelId="{20CC1A56-4300-4D8E-BD0A-91F2A59FB3EF}" type="sibTrans" cxnId="{8A55F8B5-8101-4DE2-9A58-3CD676B73192}">
+      <dgm:prSet/>
+      <dgm:spPr/>
+      <dgm:t>
+        <a:bodyPr/>
+        <a:lstStyle/>
+        <a:p>
+          <a:endParaRPr lang="en-US"/>
+        </a:p>
+      </dgm:t>
+    </dgm:pt>
+    <dgm:pt modelId="{2BC59CA1-A5E6-40EC-9A58-DE6B055C0B61}">
+      <dgm:prSet/>
+      <dgm:spPr/>
+      <dgm:t>
+        <a:bodyPr/>
+        <a:lstStyle/>
+        <a:p>
+          <a:r>
+            <a:rPr lang="en-US" b="0" i="0"/>
+            <a:t>It is a server-side scripting language used to create dynamic web pages</a:t>
+          </a:r>
+          <a:endParaRPr lang="en-US"/>
+        </a:p>
+      </dgm:t>
+    </dgm:pt>
+    <dgm:pt modelId="{B8192999-A88C-4702-AFD2-88D40EA02940}" type="parTrans" cxnId="{1B0DE698-EC55-41DC-B8EF-D505365F274C}">
+      <dgm:prSet/>
+      <dgm:spPr/>
+      <dgm:t>
+        <a:bodyPr/>
+        <a:lstStyle/>
+        <a:p>
+          <a:endParaRPr lang="en-US"/>
+        </a:p>
+      </dgm:t>
+    </dgm:pt>
+    <dgm:pt modelId="{F874AFFC-FEF2-408F-B5EE-2D6AFC408B18}" type="sibTrans" cxnId="{1B0DE698-EC55-41DC-B8EF-D505365F274C}">
+      <dgm:prSet/>
+      <dgm:spPr/>
+      <dgm:t>
+        <a:bodyPr/>
+        <a:lstStyle/>
+        <a:p>
+          <a:endParaRPr lang="en-US"/>
+        </a:p>
+      </dgm:t>
+    </dgm:pt>
+    <dgm:pt modelId="{725237F0-14B3-4272-B025-A22910DE8C63}">
+      <dgm:prSet/>
+      <dgm:spPr/>
+      <dgm:t>
+        <a:bodyPr/>
+        <a:lstStyle/>
+        <a:p>
+          <a:r>
+            <a:rPr lang="en-US" b="0" i="0"/>
+            <a:t>PHP is widely used in web development and can be integrated with HTML, CSS, and JavaScript</a:t>
+          </a:r>
+          <a:endParaRPr lang="en-US"/>
+        </a:p>
+      </dgm:t>
+    </dgm:pt>
+    <dgm:pt modelId="{75EF056F-8960-4989-8079-4C290AEA0D8D}" type="parTrans" cxnId="{CE4E0F1C-1DC5-41D7-BDC7-BF55F9BA3943}">
+      <dgm:prSet/>
+      <dgm:spPr/>
+      <dgm:t>
+        <a:bodyPr/>
+        <a:lstStyle/>
+        <a:p>
+          <a:endParaRPr lang="en-US"/>
+        </a:p>
+      </dgm:t>
+    </dgm:pt>
+    <dgm:pt modelId="{BED387E9-9BD3-49BA-BF21-4C3AADC6DFE0}" type="sibTrans" cxnId="{CE4E0F1C-1DC5-41D7-BDC7-BF55F9BA3943}">
+      <dgm:prSet/>
+      <dgm:spPr/>
+      <dgm:t>
+        <a:bodyPr/>
+        <a:lstStyle/>
+        <a:p>
+          <a:endParaRPr lang="en-US"/>
+        </a:p>
+      </dgm:t>
+    </dgm:pt>
+    <dgm:pt modelId="{50A8E9C9-20D3-415B-B02B-9055954D9733}">
+      <dgm:prSet/>
+      <dgm:spPr/>
+      <dgm:t>
+        <a:bodyPr/>
+        <a:lstStyle/>
+        <a:p>
+          <a:r>
+            <a:rPr lang="en-US" b="0" i="0"/>
+            <a:t>PHP code is executed on the server and the output is sent to the client's web browser</a:t>
+          </a:r>
+          <a:endParaRPr lang="en-US"/>
+        </a:p>
+      </dgm:t>
+    </dgm:pt>
+    <dgm:pt modelId="{3523BC5E-FAFA-4566-86DE-5A5BDCAF2FFE}" type="parTrans" cxnId="{90A8C84D-1A74-4786-9F22-D1F3832A77B3}">
+      <dgm:prSet/>
+      <dgm:spPr/>
+      <dgm:t>
+        <a:bodyPr/>
+        <a:lstStyle/>
+        <a:p>
+          <a:endParaRPr lang="en-US"/>
+        </a:p>
+      </dgm:t>
+    </dgm:pt>
+    <dgm:pt modelId="{303F5760-D1FE-43B2-B33D-8947230C27C2}" type="sibTrans" cxnId="{90A8C84D-1A74-4786-9F22-D1F3832A77B3}">
+      <dgm:prSet/>
+      <dgm:spPr/>
+      <dgm:t>
+        <a:bodyPr/>
+        <a:lstStyle/>
+        <a:p>
+          <a:endParaRPr lang="en-US"/>
+        </a:p>
+      </dgm:t>
+    </dgm:pt>
+    <dgm:pt modelId="{27896CDD-4F1E-4F27-B4A4-D52D8140049A}" type="pres">
+      <dgm:prSet presAssocID="{4C96270C-07C3-456C-AA5F-EB7A25780EED}" presName="vert0" presStyleCnt="0">
+        <dgm:presLayoutVars>
+          <dgm:dir/>
+          <dgm:animOne val="branch"/>
+          <dgm:animLvl val="lvl"/>
+        </dgm:presLayoutVars>
+      </dgm:prSet>
+      <dgm:spPr/>
+    </dgm:pt>
+    <dgm:pt modelId="{08B6598C-B6F7-480C-9EFA-29C651091859}" type="pres">
+      <dgm:prSet presAssocID="{E789E642-6918-44F1-AB61-168353D84B48}" presName="thickLine" presStyleLbl="alignNode1" presStyleIdx="0" presStyleCnt="4"/>
+      <dgm:spPr/>
+    </dgm:pt>
+    <dgm:pt modelId="{A823CBA9-5610-4532-81AE-59DFFD945522}" type="pres">
+      <dgm:prSet presAssocID="{E789E642-6918-44F1-AB61-168353D84B48}" presName="horz1" presStyleCnt="0"/>
+      <dgm:spPr/>
+    </dgm:pt>
+    <dgm:pt modelId="{EF8230F5-E4EA-4581-B5C3-5C4E66A0B8AD}" type="pres">
+      <dgm:prSet presAssocID="{E789E642-6918-44F1-AB61-168353D84B48}" presName="tx1" presStyleLbl="revTx" presStyleIdx="0" presStyleCnt="4"/>
+      <dgm:spPr/>
+    </dgm:pt>
+    <dgm:pt modelId="{C240A2EC-FB58-4181-9C05-4C8DBACD8D3C}" type="pres">
+      <dgm:prSet presAssocID="{E789E642-6918-44F1-AB61-168353D84B48}" presName="vert1" presStyleCnt="0"/>
+      <dgm:spPr/>
+    </dgm:pt>
+    <dgm:pt modelId="{A1DC7DFE-9BDB-4016-813D-A0375941BF3A}" type="pres">
+      <dgm:prSet presAssocID="{2BC59CA1-A5E6-40EC-9A58-DE6B055C0B61}" presName="thickLine" presStyleLbl="alignNode1" presStyleIdx="1" presStyleCnt="4"/>
+      <dgm:spPr/>
+    </dgm:pt>
+    <dgm:pt modelId="{E64B193F-52E2-4A4A-B811-D59DD1DD1CEE}" type="pres">
+      <dgm:prSet presAssocID="{2BC59CA1-A5E6-40EC-9A58-DE6B055C0B61}" presName="horz1" presStyleCnt="0"/>
+      <dgm:spPr/>
+    </dgm:pt>
+    <dgm:pt modelId="{48E96246-371D-4558-A48E-4ADA1EE1EED3}" type="pres">
+      <dgm:prSet presAssocID="{2BC59CA1-A5E6-40EC-9A58-DE6B055C0B61}" presName="tx1" presStyleLbl="revTx" presStyleIdx="1" presStyleCnt="4"/>
+      <dgm:spPr/>
+    </dgm:pt>
+    <dgm:pt modelId="{F1F9AFC5-2CA0-41DA-82EE-12972D233101}" type="pres">
+      <dgm:prSet presAssocID="{2BC59CA1-A5E6-40EC-9A58-DE6B055C0B61}" presName="vert1" presStyleCnt="0"/>
+      <dgm:spPr/>
+    </dgm:pt>
+    <dgm:pt modelId="{1C176645-9397-4F50-BA18-E57ECFC76832}" type="pres">
+      <dgm:prSet presAssocID="{725237F0-14B3-4272-B025-A22910DE8C63}" presName="thickLine" presStyleLbl="alignNode1" presStyleIdx="2" presStyleCnt="4"/>
+      <dgm:spPr/>
+    </dgm:pt>
+    <dgm:pt modelId="{5638B89B-BAB8-49F7-9630-EEB9EB388158}" type="pres">
+      <dgm:prSet presAssocID="{725237F0-14B3-4272-B025-A22910DE8C63}" presName="horz1" presStyleCnt="0"/>
+      <dgm:spPr/>
+    </dgm:pt>
+    <dgm:pt modelId="{FBEFE84B-F7C6-4A03-A898-081F1EED707E}" type="pres">
+      <dgm:prSet presAssocID="{725237F0-14B3-4272-B025-A22910DE8C63}" presName="tx1" presStyleLbl="revTx" presStyleIdx="2" presStyleCnt="4"/>
+      <dgm:spPr/>
+    </dgm:pt>
+    <dgm:pt modelId="{F18F9760-8D38-4C68-A2B2-86859000B69A}" type="pres">
+      <dgm:prSet presAssocID="{725237F0-14B3-4272-B025-A22910DE8C63}" presName="vert1" presStyleCnt="0"/>
+      <dgm:spPr/>
+    </dgm:pt>
+    <dgm:pt modelId="{E7F19E70-F87D-4D65-AADC-DA6F826AC5C1}" type="pres">
+      <dgm:prSet presAssocID="{50A8E9C9-20D3-415B-B02B-9055954D9733}" presName="thickLine" presStyleLbl="alignNode1" presStyleIdx="3" presStyleCnt="4"/>
+      <dgm:spPr/>
+    </dgm:pt>
+    <dgm:pt modelId="{AE36B51D-3DDD-4A9B-93E2-9A338095B08D}" type="pres">
+      <dgm:prSet presAssocID="{50A8E9C9-20D3-415B-B02B-9055954D9733}" presName="horz1" presStyleCnt="0"/>
+      <dgm:spPr/>
+    </dgm:pt>
+    <dgm:pt modelId="{31AEDAD3-3A97-40B3-8D50-2107892173A5}" type="pres">
+      <dgm:prSet presAssocID="{50A8E9C9-20D3-415B-B02B-9055954D9733}" presName="tx1" presStyleLbl="revTx" presStyleIdx="3" presStyleCnt="4"/>
+      <dgm:spPr/>
+    </dgm:pt>
+    <dgm:pt modelId="{53AE1FFB-9032-45BD-B4D8-8B4BC0705341}" type="pres">
+      <dgm:prSet presAssocID="{50A8E9C9-20D3-415B-B02B-9055954D9733}" presName="vert1" presStyleCnt="0"/>
+      <dgm:spPr/>
+    </dgm:pt>
+  </dgm:ptLst>
+  <dgm:cxnLst>
+    <dgm:cxn modelId="{CE4E0F1C-1DC5-41D7-BDC7-BF55F9BA3943}" srcId="{4C96270C-07C3-456C-AA5F-EB7A25780EED}" destId="{725237F0-14B3-4272-B025-A22910DE8C63}" srcOrd="2" destOrd="0" parTransId="{75EF056F-8960-4989-8079-4C290AEA0D8D}" sibTransId="{BED387E9-9BD3-49BA-BF21-4C3AADC6DFE0}"/>
+    <dgm:cxn modelId="{5EAAEB64-A915-4B12-A839-3661ABB9507E}" type="presOf" srcId="{E789E642-6918-44F1-AB61-168353D84B48}" destId="{EF8230F5-E4EA-4581-B5C3-5C4E66A0B8AD}" srcOrd="0" destOrd="0" presId="urn:microsoft.com/office/officeart/2008/layout/LinedList"/>
+    <dgm:cxn modelId="{82E52849-1080-48B4-B70C-D5ADCAD5FC0D}" type="presOf" srcId="{50A8E9C9-20D3-415B-B02B-9055954D9733}" destId="{31AEDAD3-3A97-40B3-8D50-2107892173A5}" srcOrd="0" destOrd="0" presId="urn:microsoft.com/office/officeart/2008/layout/LinedList"/>
+    <dgm:cxn modelId="{90A8C84D-1A74-4786-9F22-D1F3832A77B3}" srcId="{4C96270C-07C3-456C-AA5F-EB7A25780EED}" destId="{50A8E9C9-20D3-415B-B02B-9055954D9733}" srcOrd="3" destOrd="0" parTransId="{3523BC5E-FAFA-4566-86DE-5A5BDCAF2FFE}" sibTransId="{303F5760-D1FE-43B2-B33D-8947230C27C2}"/>
+    <dgm:cxn modelId="{E972748D-2872-4910-8BB9-F59FB6917DEC}" type="presOf" srcId="{4C96270C-07C3-456C-AA5F-EB7A25780EED}" destId="{27896CDD-4F1E-4F27-B4A4-D52D8140049A}" srcOrd="0" destOrd="0" presId="urn:microsoft.com/office/officeart/2008/layout/LinedList"/>
+    <dgm:cxn modelId="{1B0DE698-EC55-41DC-B8EF-D505365F274C}" srcId="{4C96270C-07C3-456C-AA5F-EB7A25780EED}" destId="{2BC59CA1-A5E6-40EC-9A58-DE6B055C0B61}" srcOrd="1" destOrd="0" parTransId="{B8192999-A88C-4702-AFD2-88D40EA02940}" sibTransId="{F874AFFC-FEF2-408F-B5EE-2D6AFC408B18}"/>
+    <dgm:cxn modelId="{4A9510B3-9B6E-47EA-BDAA-97B8149A7A87}" type="presOf" srcId="{725237F0-14B3-4272-B025-A22910DE8C63}" destId="{FBEFE84B-F7C6-4A03-A898-081F1EED707E}" srcOrd="0" destOrd="0" presId="urn:microsoft.com/office/officeart/2008/layout/LinedList"/>
+    <dgm:cxn modelId="{8A55F8B5-8101-4DE2-9A58-3CD676B73192}" srcId="{4C96270C-07C3-456C-AA5F-EB7A25780EED}" destId="{E789E642-6918-44F1-AB61-168353D84B48}" srcOrd="0" destOrd="0" parTransId="{17330C4D-BE77-4973-A403-E724874D2524}" sibTransId="{20CC1A56-4300-4D8E-BD0A-91F2A59FB3EF}"/>
+    <dgm:cxn modelId="{76B260C3-82AA-4AD6-930E-0CB08C5F6528}" type="presOf" srcId="{2BC59CA1-A5E6-40EC-9A58-DE6B055C0B61}" destId="{48E96246-371D-4558-A48E-4ADA1EE1EED3}" srcOrd="0" destOrd="0" presId="urn:microsoft.com/office/officeart/2008/layout/LinedList"/>
+    <dgm:cxn modelId="{A51341AE-18A2-46C4-9E2C-EF98B144302B}" type="presParOf" srcId="{27896CDD-4F1E-4F27-B4A4-D52D8140049A}" destId="{08B6598C-B6F7-480C-9EFA-29C651091859}" srcOrd="0" destOrd="0" presId="urn:microsoft.com/office/officeart/2008/layout/LinedList"/>
+    <dgm:cxn modelId="{46C3512C-FEB6-4013-91FA-0B7771EC45BC}" type="presParOf" srcId="{27896CDD-4F1E-4F27-B4A4-D52D8140049A}" destId="{A823CBA9-5610-4532-81AE-59DFFD945522}" srcOrd="1" destOrd="0" presId="urn:microsoft.com/office/officeart/2008/layout/LinedList"/>
+    <dgm:cxn modelId="{4B5D85A5-549C-40E5-AFB4-3A8B9873CF61}" type="presParOf" srcId="{A823CBA9-5610-4532-81AE-59DFFD945522}" destId="{EF8230F5-E4EA-4581-B5C3-5C4E66A0B8AD}" srcOrd="0" destOrd="0" presId="urn:microsoft.com/office/officeart/2008/layout/LinedList"/>
+    <dgm:cxn modelId="{138C1914-0195-4C01-9E56-8502C6448503}" type="presParOf" srcId="{A823CBA9-5610-4532-81AE-59DFFD945522}" destId="{C240A2EC-FB58-4181-9C05-4C8DBACD8D3C}" srcOrd="1" destOrd="0" presId="urn:microsoft.com/office/officeart/2008/layout/LinedList"/>
+    <dgm:cxn modelId="{734F1109-6C3F-41B6-B7B1-370FC108BA99}" type="presParOf" srcId="{27896CDD-4F1E-4F27-B4A4-D52D8140049A}" destId="{A1DC7DFE-9BDB-4016-813D-A0375941BF3A}" srcOrd="2" destOrd="0" presId="urn:microsoft.com/office/officeart/2008/layout/LinedList"/>
+    <dgm:cxn modelId="{B3065B14-2314-4453-A823-620CEA4ED9D3}" type="presParOf" srcId="{27896CDD-4F1E-4F27-B4A4-D52D8140049A}" destId="{E64B193F-52E2-4A4A-B811-D59DD1DD1CEE}" srcOrd="3" destOrd="0" presId="urn:microsoft.com/office/officeart/2008/layout/LinedList"/>
+    <dgm:cxn modelId="{0D24B051-7529-4E8E-B8EB-64D9382F6917}" type="presParOf" srcId="{E64B193F-52E2-4A4A-B811-D59DD1DD1CEE}" destId="{48E96246-371D-4558-A48E-4ADA1EE1EED3}" srcOrd="0" destOrd="0" presId="urn:microsoft.com/office/officeart/2008/layout/LinedList"/>
+    <dgm:cxn modelId="{621FD578-0618-4E87-B137-7EDC2FE84BDA}" type="presParOf" srcId="{E64B193F-52E2-4A4A-B811-D59DD1DD1CEE}" destId="{F1F9AFC5-2CA0-41DA-82EE-12972D233101}" srcOrd="1" destOrd="0" presId="urn:microsoft.com/office/officeart/2008/layout/LinedList"/>
+    <dgm:cxn modelId="{E7CE312B-4656-4926-B9EA-E6871A0127F4}" type="presParOf" srcId="{27896CDD-4F1E-4F27-B4A4-D52D8140049A}" destId="{1C176645-9397-4F50-BA18-E57ECFC76832}" srcOrd="4" destOrd="0" presId="urn:microsoft.com/office/officeart/2008/layout/LinedList"/>
+    <dgm:cxn modelId="{71063692-9165-4A1E-8B3C-D64DAC6FE30B}" type="presParOf" srcId="{27896CDD-4F1E-4F27-B4A4-D52D8140049A}" destId="{5638B89B-BAB8-49F7-9630-EEB9EB388158}" srcOrd="5" destOrd="0" presId="urn:microsoft.com/office/officeart/2008/layout/LinedList"/>
+    <dgm:cxn modelId="{517DEE68-9DD9-4107-8DE9-02643742BAF3}" type="presParOf" srcId="{5638B89B-BAB8-49F7-9630-EEB9EB388158}" destId="{FBEFE84B-F7C6-4A03-A898-081F1EED707E}" srcOrd="0" destOrd="0" presId="urn:microsoft.com/office/officeart/2008/layout/LinedList"/>
+    <dgm:cxn modelId="{84650049-C593-4998-924A-4959CBDD4C19}" type="presParOf" srcId="{5638B89B-BAB8-49F7-9630-EEB9EB388158}" destId="{F18F9760-8D38-4C68-A2B2-86859000B69A}" srcOrd="1" destOrd="0" presId="urn:microsoft.com/office/officeart/2008/layout/LinedList"/>
+    <dgm:cxn modelId="{DFEE879D-112C-4A89-9B70-4D0808928C5F}" type="presParOf" srcId="{27896CDD-4F1E-4F27-B4A4-D52D8140049A}" destId="{E7F19E70-F87D-4D65-AADC-DA6F826AC5C1}" srcOrd="6" destOrd="0" presId="urn:microsoft.com/office/officeart/2008/layout/LinedList"/>
+    <dgm:cxn modelId="{CF359775-844B-431E-B0DF-D1A45FC7A852}" type="presParOf" srcId="{27896CDD-4F1E-4F27-B4A4-D52D8140049A}" destId="{AE36B51D-3DDD-4A9B-93E2-9A338095B08D}" srcOrd="7" destOrd="0" presId="urn:microsoft.com/office/officeart/2008/layout/LinedList"/>
+    <dgm:cxn modelId="{E177E5C3-AFCC-4676-A254-216D58F5AA8B}" type="presParOf" srcId="{AE36B51D-3DDD-4A9B-93E2-9A338095B08D}" destId="{31AEDAD3-3A97-40B3-8D50-2107892173A5}" srcOrd="0" destOrd="0" presId="urn:microsoft.com/office/officeart/2008/layout/LinedList"/>
+    <dgm:cxn modelId="{33AF51AE-D83A-4DBC-94C9-D3BD61FEF965}" type="presParOf" srcId="{AE36B51D-3DDD-4A9B-93E2-9A338095B08D}" destId="{53AE1FFB-9032-45BD-B4D8-8B4BC0705341}" srcOrd="1" destOrd="0" presId="urn:microsoft.com/office/officeart/2008/layout/LinedList"/>
+  </dgm:cxnLst>
+  <dgm:bg/>
+  <dgm:whole/>
+  <dgm:extLst>
+    <a:ext uri="http://schemas.microsoft.com/office/drawing/2008/diagram">
+      <dsp:dataModelExt xmlns:dsp="http://schemas.microsoft.com/office/drawing/2008/diagram" relId="rId8" minVer="http://schemas.openxmlformats.org/drawingml/2006/diagram"/>
+    </a:ext>
+  </dgm:extLst>
+</dgm:dataModel>
+</file>
+
+<file path=ppt/diagrams/drawing1.xml><?xml version="1.0" encoding="utf-8"?>
+<dsp:drawing xmlns:dgm="http://schemas.openxmlformats.org/drawingml/2006/diagram" xmlns:dsp="http://schemas.microsoft.com/office/drawing/2008/diagram" xmlns:a="http://schemas.openxmlformats.org/drawingml/2006/main">
+  <dsp:spTree>
+    <dsp:nvGrpSpPr>
+      <dsp:cNvPr id="0" name=""/>
+      <dsp:cNvGrpSpPr/>
+    </dsp:nvGrpSpPr>
+    <dsp:grpSpPr/>
+    <dsp:sp modelId="{08B6598C-B6F7-480C-9EFA-29C651091859}">
+      <dsp:nvSpPr>
+        <dsp:cNvPr id="0" name=""/>
+        <dsp:cNvSpPr/>
+      </dsp:nvSpPr>
+      <dsp:spPr>
+        <a:xfrm>
+          <a:off x="0" y="0"/>
+          <a:ext cx="6266011" cy="0"/>
+        </a:xfrm>
+        <a:prstGeom prst="line">
+          <a:avLst/>
+        </a:prstGeom>
+        <a:gradFill rotWithShape="0">
+          <a:gsLst>
+            <a:gs pos="0">
+              <a:schemeClr val="accent2">
+                <a:hueOff val="0"/>
+                <a:satOff val="0"/>
+                <a:lumOff val="0"/>
+                <a:alphaOff val="0"/>
+                <a:tint val="96000"/>
+                <a:lumMod val="104000"/>
+              </a:schemeClr>
+            </a:gs>
+            <a:gs pos="100000">
+              <a:schemeClr val="accent2">
+                <a:hueOff val="0"/>
+                <a:satOff val="0"/>
+                <a:lumOff val="0"/>
+                <a:alphaOff val="0"/>
+                <a:shade val="90000"/>
+                <a:lumMod val="90000"/>
+              </a:schemeClr>
+            </a:gs>
+          </a:gsLst>
+          <a:lin ang="5400000" scaled="0"/>
+        </a:gradFill>
+        <a:ln w="9525" cap="rnd" cmpd="sng" algn="ctr">
+          <a:solidFill>
+            <a:schemeClr val="accent2">
+              <a:hueOff val="0"/>
+              <a:satOff val="0"/>
+              <a:lumOff val="0"/>
+              <a:alphaOff val="0"/>
+            </a:schemeClr>
+          </a:solidFill>
+          <a:prstDash val="solid"/>
+        </a:ln>
+        <a:effectLst>
+          <a:outerShdw blurRad="63500" dist="25400" dir="5400000" rotWithShape="0">
+            <a:srgbClr val="000000">
+              <a:alpha val="60000"/>
+            </a:srgbClr>
+          </a:outerShdw>
+        </a:effectLst>
+      </dsp:spPr>
+      <dsp:style>
+        <a:lnRef idx="1">
+          <a:scrgbClr r="0" g="0" b="0"/>
+        </a:lnRef>
+        <a:fillRef idx="3">
+          <a:scrgbClr r="0" g="0" b="0"/>
+        </a:fillRef>
+        <a:effectRef idx="2">
+          <a:scrgbClr r="0" g="0" b="0"/>
+        </a:effectRef>
+        <a:fontRef idx="minor">
+          <a:schemeClr val="lt1"/>
+        </a:fontRef>
+      </dsp:style>
+    </dsp:sp>
+    <dsp:sp modelId="{EF8230F5-E4EA-4581-B5C3-5C4E66A0B8AD}">
+      <dsp:nvSpPr>
+        <dsp:cNvPr id="0" name=""/>
+        <dsp:cNvSpPr/>
+      </dsp:nvSpPr>
+      <dsp:spPr>
+        <a:xfrm>
+          <a:off x="0" y="0"/>
+          <a:ext cx="6266011" cy="1224886"/>
+        </a:xfrm>
+        <a:prstGeom prst="rect">
+          <a:avLst/>
+        </a:prstGeom>
+        <a:noFill/>
+        <a:ln>
+          <a:noFill/>
+        </a:ln>
+        <a:effectLst/>
+      </dsp:spPr>
+      <dsp:style>
+        <a:lnRef idx="0">
+          <a:scrgbClr r="0" g="0" b="0"/>
+        </a:lnRef>
+        <a:fillRef idx="0">
+          <a:scrgbClr r="0" g="0" b="0"/>
+        </a:fillRef>
+        <a:effectRef idx="0">
+          <a:scrgbClr r="0" g="0" b="0"/>
+        </a:effectRef>
+        <a:fontRef idx="minor"/>
+      </dsp:style>
+      <dsp:txBody>
+        <a:bodyPr spcFirstLastPara="0" vert="horz" wrap="square" lIns="95250" tIns="95250" rIns="95250" bIns="95250" numCol="1" spcCol="1270" anchor="t" anchorCtr="0">
+          <a:noAutofit/>
+        </a:bodyPr>
+        <a:lstStyle/>
+        <a:p>
+          <a:pPr marL="0" lvl="0" indent="0" algn="l" defTabSz="1111250">
+            <a:lnSpc>
+              <a:spcPct val="90000"/>
+            </a:lnSpc>
+            <a:spcBef>
+              <a:spcPct val="0"/>
+            </a:spcBef>
+            <a:spcAft>
+              <a:spcPct val="35000"/>
+            </a:spcAft>
+            <a:buNone/>
+          </a:pPr>
+          <a:r>
+            <a:rPr lang="en-US" sz="2500" b="0" i="0" kern="1200"/>
+            <a:t>PHP stands for Hypertext Preprocessor</a:t>
+          </a:r>
+          <a:endParaRPr lang="en-US" sz="2500" kern="1200"/>
+        </a:p>
+      </dsp:txBody>
+      <dsp:txXfrm>
+        <a:off x="0" y="0"/>
+        <a:ext cx="6266011" cy="1224886"/>
+      </dsp:txXfrm>
+    </dsp:sp>
+    <dsp:sp modelId="{A1DC7DFE-9BDB-4016-813D-A0375941BF3A}">
+      <dsp:nvSpPr>
+        <dsp:cNvPr id="0" name=""/>
+        <dsp:cNvSpPr/>
+      </dsp:nvSpPr>
+      <dsp:spPr>
+        <a:xfrm>
+          <a:off x="0" y="1224886"/>
+          <a:ext cx="6266011" cy="0"/>
+        </a:xfrm>
+        <a:prstGeom prst="line">
+          <a:avLst/>
+        </a:prstGeom>
+        <a:gradFill rotWithShape="0">
+          <a:gsLst>
+            <a:gs pos="0">
+              <a:schemeClr val="accent2">
+                <a:hueOff val="-236686"/>
+                <a:satOff val="-1956"/>
+                <a:lumOff val="-4183"/>
+                <a:alphaOff val="0"/>
+                <a:tint val="96000"/>
+                <a:lumMod val="104000"/>
+              </a:schemeClr>
+            </a:gs>
+            <a:gs pos="100000">
+              <a:schemeClr val="accent2">
+                <a:hueOff val="-236686"/>
+                <a:satOff val="-1956"/>
+                <a:lumOff val="-4183"/>
+                <a:alphaOff val="0"/>
+                <a:shade val="90000"/>
+                <a:lumMod val="90000"/>
+              </a:schemeClr>
+            </a:gs>
+          </a:gsLst>
+          <a:lin ang="5400000" scaled="0"/>
+        </a:gradFill>
+        <a:ln w="9525" cap="rnd" cmpd="sng" algn="ctr">
+          <a:solidFill>
+            <a:schemeClr val="accent2">
+              <a:hueOff val="-236686"/>
+              <a:satOff val="-1956"/>
+              <a:lumOff val="-4183"/>
+              <a:alphaOff val="0"/>
+            </a:schemeClr>
+          </a:solidFill>
+          <a:prstDash val="solid"/>
+        </a:ln>
+        <a:effectLst>
+          <a:outerShdw blurRad="63500" dist="25400" dir="5400000" rotWithShape="0">
+            <a:srgbClr val="000000">
+              <a:alpha val="60000"/>
+            </a:srgbClr>
+          </a:outerShdw>
+        </a:effectLst>
+      </dsp:spPr>
+      <dsp:style>
+        <a:lnRef idx="1">
+          <a:scrgbClr r="0" g="0" b="0"/>
+        </a:lnRef>
+        <a:fillRef idx="3">
+          <a:scrgbClr r="0" g="0" b="0"/>
+        </a:fillRef>
+        <a:effectRef idx="2">
+          <a:scrgbClr r="0" g="0" b="0"/>
+        </a:effectRef>
+        <a:fontRef idx="minor">
+          <a:schemeClr val="lt1"/>
+        </a:fontRef>
+      </dsp:style>
+    </dsp:sp>
+    <dsp:sp modelId="{48E96246-371D-4558-A48E-4ADA1EE1EED3}">
+      <dsp:nvSpPr>
+        <dsp:cNvPr id="0" name=""/>
+        <dsp:cNvSpPr/>
+      </dsp:nvSpPr>
+      <dsp:spPr>
+        <a:xfrm>
+          <a:off x="0" y="1224886"/>
+          <a:ext cx="6266011" cy="1224886"/>
+        </a:xfrm>
+        <a:prstGeom prst="rect">
+          <a:avLst/>
+        </a:prstGeom>
+        <a:noFill/>
+        <a:ln>
+          <a:noFill/>
+        </a:ln>
+        <a:effectLst/>
+      </dsp:spPr>
+      <dsp:style>
+        <a:lnRef idx="0">
+          <a:scrgbClr r="0" g="0" b="0"/>
+        </a:lnRef>
+        <a:fillRef idx="0">
+          <a:scrgbClr r="0" g="0" b="0"/>
+        </a:fillRef>
+        <a:effectRef idx="0">
+          <a:scrgbClr r="0" g="0" b="0"/>
+        </a:effectRef>
+        <a:fontRef idx="minor"/>
+      </dsp:style>
+      <dsp:txBody>
+        <a:bodyPr spcFirstLastPara="0" vert="horz" wrap="square" lIns="95250" tIns="95250" rIns="95250" bIns="95250" numCol="1" spcCol="1270" anchor="t" anchorCtr="0">
+          <a:noAutofit/>
+        </a:bodyPr>
+        <a:lstStyle/>
+        <a:p>
+          <a:pPr marL="0" lvl="0" indent="0" algn="l" defTabSz="1111250">
+            <a:lnSpc>
+              <a:spcPct val="90000"/>
+            </a:lnSpc>
+            <a:spcBef>
+              <a:spcPct val="0"/>
+            </a:spcBef>
+            <a:spcAft>
+              <a:spcPct val="35000"/>
+            </a:spcAft>
+            <a:buNone/>
+          </a:pPr>
+          <a:r>
+            <a:rPr lang="en-US" sz="2500" b="0" i="0" kern="1200"/>
+            <a:t>It is a server-side scripting language used to create dynamic web pages</a:t>
+          </a:r>
+          <a:endParaRPr lang="en-US" sz="2500" kern="1200"/>
+        </a:p>
+      </dsp:txBody>
+      <dsp:txXfrm>
+        <a:off x="0" y="1224886"/>
+        <a:ext cx="6266011" cy="1224886"/>
+      </dsp:txXfrm>
+    </dsp:sp>
+    <dsp:sp modelId="{1C176645-9397-4F50-BA18-E57ECFC76832}">
+      <dsp:nvSpPr>
+        <dsp:cNvPr id="0" name=""/>
+        <dsp:cNvSpPr/>
+      </dsp:nvSpPr>
+      <dsp:spPr>
+        <a:xfrm>
+          <a:off x="0" y="2449773"/>
+          <a:ext cx="6266011" cy="0"/>
+        </a:xfrm>
+        <a:prstGeom prst="line">
+          <a:avLst/>
+        </a:prstGeom>
+        <a:gradFill rotWithShape="0">
+          <a:gsLst>
+            <a:gs pos="0">
+              <a:schemeClr val="accent2">
+                <a:hueOff val="-473373"/>
+                <a:satOff val="-3912"/>
+                <a:lumOff val="-8366"/>
+                <a:alphaOff val="0"/>
+                <a:tint val="96000"/>
+                <a:lumMod val="104000"/>
+              </a:schemeClr>
+            </a:gs>
+            <a:gs pos="100000">
+              <a:schemeClr val="accent2">
+                <a:hueOff val="-473373"/>
+                <a:satOff val="-3912"/>
+                <a:lumOff val="-8366"/>
+                <a:alphaOff val="0"/>
+                <a:shade val="90000"/>
+                <a:lumMod val="90000"/>
+              </a:schemeClr>
+            </a:gs>
+          </a:gsLst>
+          <a:lin ang="5400000" scaled="0"/>
+        </a:gradFill>
+        <a:ln w="9525" cap="rnd" cmpd="sng" algn="ctr">
+          <a:solidFill>
+            <a:schemeClr val="accent2">
+              <a:hueOff val="-473373"/>
+              <a:satOff val="-3912"/>
+              <a:lumOff val="-8366"/>
+              <a:alphaOff val="0"/>
+            </a:schemeClr>
+          </a:solidFill>
+          <a:prstDash val="solid"/>
+        </a:ln>
+        <a:effectLst>
+          <a:outerShdw blurRad="63500" dist="25400" dir="5400000" rotWithShape="0">
+            <a:srgbClr val="000000">
+              <a:alpha val="60000"/>
+            </a:srgbClr>
+          </a:outerShdw>
+        </a:effectLst>
+      </dsp:spPr>
+      <dsp:style>
+        <a:lnRef idx="1">
+          <a:scrgbClr r="0" g="0" b="0"/>
+        </a:lnRef>
+        <a:fillRef idx="3">
+          <a:scrgbClr r="0" g="0" b="0"/>
+        </a:fillRef>
+        <a:effectRef idx="2">
+          <a:scrgbClr r="0" g="0" b="0"/>
+        </a:effectRef>
+        <a:fontRef idx="minor">
+          <a:schemeClr val="lt1"/>
+        </a:fontRef>
+      </dsp:style>
+    </dsp:sp>
+    <dsp:sp modelId="{FBEFE84B-F7C6-4A03-A898-081F1EED707E}">
+      <dsp:nvSpPr>
+        <dsp:cNvPr id="0" name=""/>
+        <dsp:cNvSpPr/>
+      </dsp:nvSpPr>
+      <dsp:spPr>
+        <a:xfrm>
+          <a:off x="0" y="2449773"/>
+          <a:ext cx="6266011" cy="1224886"/>
+        </a:xfrm>
+        <a:prstGeom prst="rect">
+          <a:avLst/>
+        </a:prstGeom>
+        <a:noFill/>
+        <a:ln>
+          <a:noFill/>
+        </a:ln>
+        <a:effectLst/>
+      </dsp:spPr>
+      <dsp:style>
+        <a:lnRef idx="0">
+          <a:scrgbClr r="0" g="0" b="0"/>
+        </a:lnRef>
+        <a:fillRef idx="0">
+          <a:scrgbClr r="0" g="0" b="0"/>
+        </a:fillRef>
+        <a:effectRef idx="0">
+          <a:scrgbClr r="0" g="0" b="0"/>
+        </a:effectRef>
+        <a:fontRef idx="minor"/>
+      </dsp:style>
+      <dsp:txBody>
+        <a:bodyPr spcFirstLastPara="0" vert="horz" wrap="square" lIns="95250" tIns="95250" rIns="95250" bIns="95250" numCol="1" spcCol="1270" anchor="t" anchorCtr="0">
+          <a:noAutofit/>
+        </a:bodyPr>
+        <a:lstStyle/>
+        <a:p>
+          <a:pPr marL="0" lvl="0" indent="0" algn="l" defTabSz="1111250">
+            <a:lnSpc>
+              <a:spcPct val="90000"/>
+            </a:lnSpc>
+            <a:spcBef>
+              <a:spcPct val="0"/>
+            </a:spcBef>
+            <a:spcAft>
+              <a:spcPct val="35000"/>
+            </a:spcAft>
+            <a:buNone/>
+          </a:pPr>
+          <a:r>
+            <a:rPr lang="en-US" sz="2500" b="0" i="0" kern="1200"/>
+            <a:t>PHP is widely used in web development and can be integrated with HTML, CSS, and JavaScript</a:t>
+          </a:r>
+          <a:endParaRPr lang="en-US" sz="2500" kern="1200"/>
+        </a:p>
+      </dsp:txBody>
+      <dsp:txXfrm>
+        <a:off x="0" y="2449773"/>
+        <a:ext cx="6266011" cy="1224886"/>
+      </dsp:txXfrm>
+    </dsp:sp>
+    <dsp:sp modelId="{E7F19E70-F87D-4D65-AADC-DA6F826AC5C1}">
+      <dsp:nvSpPr>
+        <dsp:cNvPr id="0" name=""/>
+        <dsp:cNvSpPr/>
+      </dsp:nvSpPr>
+      <dsp:spPr>
+        <a:xfrm>
+          <a:off x="0" y="3674660"/>
+          <a:ext cx="6266011" cy="0"/>
+        </a:xfrm>
+        <a:prstGeom prst="line">
+          <a:avLst/>
+        </a:prstGeom>
+        <a:gradFill rotWithShape="0">
+          <a:gsLst>
+            <a:gs pos="0">
+              <a:schemeClr val="accent2">
+                <a:hueOff val="-710059"/>
+                <a:satOff val="-5868"/>
+                <a:lumOff val="-12549"/>
+                <a:alphaOff val="0"/>
+                <a:tint val="96000"/>
+                <a:lumMod val="104000"/>
+              </a:schemeClr>
+            </a:gs>
+            <a:gs pos="100000">
+              <a:schemeClr val="accent2">
+                <a:hueOff val="-710059"/>
+                <a:satOff val="-5868"/>
+                <a:lumOff val="-12549"/>
+                <a:alphaOff val="0"/>
+                <a:shade val="90000"/>
+                <a:lumMod val="90000"/>
+              </a:schemeClr>
+            </a:gs>
+          </a:gsLst>
+          <a:lin ang="5400000" scaled="0"/>
+        </a:gradFill>
+        <a:ln w="9525" cap="rnd" cmpd="sng" algn="ctr">
+          <a:solidFill>
+            <a:schemeClr val="accent2">
+              <a:hueOff val="-710059"/>
+              <a:satOff val="-5868"/>
+              <a:lumOff val="-12549"/>
+              <a:alphaOff val="0"/>
+            </a:schemeClr>
+          </a:solidFill>
+          <a:prstDash val="solid"/>
+        </a:ln>
+        <a:effectLst>
+          <a:outerShdw blurRad="63500" dist="25400" dir="5400000" rotWithShape="0">
+            <a:srgbClr val="000000">
+              <a:alpha val="60000"/>
+            </a:srgbClr>
+          </a:outerShdw>
+        </a:effectLst>
+      </dsp:spPr>
+      <dsp:style>
+        <a:lnRef idx="1">
+          <a:scrgbClr r="0" g="0" b="0"/>
+        </a:lnRef>
+        <a:fillRef idx="3">
+          <a:scrgbClr r="0" g="0" b="0"/>
+        </a:fillRef>
+        <a:effectRef idx="2">
+          <a:scrgbClr r="0" g="0" b="0"/>
+        </a:effectRef>
+        <a:fontRef idx="minor">
+          <a:schemeClr val="lt1"/>
+        </a:fontRef>
+      </dsp:style>
+    </dsp:sp>
+    <dsp:sp modelId="{31AEDAD3-3A97-40B3-8D50-2107892173A5}">
+      <dsp:nvSpPr>
+        <dsp:cNvPr id="0" name=""/>
+        <dsp:cNvSpPr/>
+      </dsp:nvSpPr>
+      <dsp:spPr>
+        <a:xfrm>
+          <a:off x="0" y="3674660"/>
+          <a:ext cx="6266011" cy="1224886"/>
+        </a:xfrm>
+        <a:prstGeom prst="rect">
+          <a:avLst/>
+        </a:prstGeom>
+        <a:noFill/>
+        <a:ln>
+          <a:noFill/>
+        </a:ln>
+        <a:effectLst/>
+      </dsp:spPr>
+      <dsp:style>
+        <a:lnRef idx="0">
+          <a:scrgbClr r="0" g="0" b="0"/>
+        </a:lnRef>
+        <a:fillRef idx="0">
+          <a:scrgbClr r="0" g="0" b="0"/>
+        </a:fillRef>
+        <a:effectRef idx="0">
+          <a:scrgbClr r="0" g="0" b="0"/>
+        </a:effectRef>
+        <a:fontRef idx="minor"/>
+      </dsp:style>
+      <dsp:txBody>
+        <a:bodyPr spcFirstLastPara="0" vert="horz" wrap="square" lIns="95250" tIns="95250" rIns="95250" bIns="95250" numCol="1" spcCol="1270" anchor="t" anchorCtr="0">
+          <a:noAutofit/>
+        </a:bodyPr>
+        <a:lstStyle/>
+        <a:p>
+          <a:pPr marL="0" lvl="0" indent="0" algn="l" defTabSz="1111250">
+            <a:lnSpc>
+              <a:spcPct val="90000"/>
+            </a:lnSpc>
+            <a:spcBef>
+              <a:spcPct val="0"/>
+            </a:spcBef>
+            <a:spcAft>
+              <a:spcPct val="35000"/>
+            </a:spcAft>
+            <a:buNone/>
+          </a:pPr>
+          <a:r>
+            <a:rPr lang="en-US" sz="2500" b="0" i="0" kern="1200"/>
+            <a:t>PHP code is executed on the server and the output is sent to the client's web browser</a:t>
+          </a:r>
+          <a:endParaRPr lang="en-US" sz="2500" kern="1200"/>
+        </a:p>
+      </dsp:txBody>
+      <dsp:txXfrm>
+        <a:off x="0" y="3674660"/>
+        <a:ext cx="6266011" cy="1224886"/>
+      </dsp:txXfrm>
+    </dsp:sp>
+  </dsp:spTree>
+</dsp:drawing>
+</file>
+
+<file path=ppt/diagrams/layout1.xml><?xml version="1.0" encoding="utf-8"?>
+<dgm:layoutDef xmlns:dgm="http://schemas.openxmlformats.org/drawingml/2006/diagram" xmlns:a="http://schemas.openxmlformats.org/drawingml/2006/main" uniqueId="urn:microsoft.com/office/officeart/2008/layout/LinedList">
+  <dgm:title val=""/>
+  <dgm:desc val=""/>
+  <dgm:catLst>
+    <dgm:cat type="hierarchy" pri="8000"/>
+    <dgm:cat type="list" pri="2500"/>
+  </dgm:catLst>
+  <dgm:sampData>
+    <dgm:dataModel>
+      <dgm:ptLst>
+        <dgm:pt modelId="0" type="doc"/>
+        <dgm:pt modelId="1">
+          <dgm:prSet phldr="1"/>
+        </dgm:pt>
+        <dgm:pt modelId="11">
+          <dgm:prSet phldr="1"/>
+        </dgm:pt>
+        <dgm:pt modelId="12">
+          <dgm:prSet phldr="1"/>
+        </dgm:pt>
+        <dgm:pt modelId="13">
+          <dgm:prSet phldr="1"/>
+        </dgm:pt>
+      </dgm:ptLst>
+      <dgm:cxnLst>
+        <dgm:cxn modelId="2" srcId="0" destId="1" srcOrd="0" destOrd="0"/>
+        <dgm:cxn modelId="3" srcId="1" destId="11" srcOrd="0" destOrd="0"/>
+        <dgm:cxn modelId="4" srcId="1" destId="12" srcOrd="1" destOrd="0"/>
+        <dgm:cxn modelId="5" srcId="1" destId="13" srcOrd="2" destOrd="0"/>
+      </dgm:cxnLst>
+      <dgm:bg/>
+      <dgm:whole/>
+    </dgm:dataModel>
+  </dgm:sampData>
+  <dgm:styleData>
+    <dgm:dataModel>
+      <dgm:ptLst>
+        <dgm:pt modelId="0" type="doc"/>
+        <dgm:pt modelId="1">
+          <dgm:prSet phldr="1"/>
+        </dgm:pt>
+        <dgm:pt modelId="11">
+          <dgm:prSet phldr="1"/>
+        </dgm:pt>
+        <dgm:pt modelId="12">
+          <dgm:prSet phldr="1"/>
+        </dgm:pt>
+      </dgm:ptLst>
+      <dgm:cxnLst>
+        <dgm:cxn modelId="2" srcId="0" destId="1" srcOrd="0" destOrd="0"/>
+        <dgm:cxn modelId="3" srcId="1" destId="11" srcOrd="0" destOrd="0"/>
+        <dgm:cxn modelId="4" srcId="1" destId="12" srcOrd="1" destOrd="0"/>
+      </dgm:cxnLst>
+      <dgm:bg/>
+      <dgm:whole/>
+    </dgm:dataModel>
+  </dgm:styleData>
+  <dgm:clrData>
+    <dgm:dataModel>
+      <dgm:ptLst>
+        <dgm:pt modelId="0" type="doc"/>
+        <dgm:pt modelId="1">
+          <dgm:prSet phldr="1"/>
+        </dgm:pt>
+        <dgm:pt modelId="11">
+          <dgm:prSet phldr="1"/>
+        </dgm:pt>
+        <dgm:pt modelId="12">
+          <dgm:prSet phldr="1"/>
+        </dgm:pt>
+      </dgm:ptLst>
+      <dgm:cxnLst>
+        <dgm:cxn modelId="2" srcId="0" destId="1" srcOrd="0" destOrd="0"/>
+        <dgm:cxn modelId="3" srcId="1" destId="11" srcOrd="0" destOrd="0"/>
+        <dgm:cxn modelId="4" srcId="1" destId="12" srcOrd="1" destOrd="0"/>
+      </dgm:cxnLst>
+      <dgm:bg/>
+      <dgm:whole/>
+    </dgm:dataModel>
+  </dgm:clrData>
+  <dgm:layoutNode name="vert0">
+    <dgm:varLst>
+      <dgm:dir/>
+      <dgm:animOne val="branch"/>
+      <dgm:animLvl val="lvl"/>
+    </dgm:varLst>
+    <dgm:choose name="Name0">
+      <dgm:if name="Name1" func="var" arg="dir" op="equ" val="norm">
+        <dgm:alg type="lin">
+          <dgm:param type="linDir" val="fromT"/>
+          <dgm:param type="nodeHorzAlign" val="l"/>
+        </dgm:alg>
+      </dgm:if>
+      <dgm:else name="Name2">
+        <dgm:alg type="lin">
+          <dgm:param type="linDir" val="fromT"/>
+          <dgm:param type="nodeHorzAlign" val="r"/>
+        </dgm:alg>
+      </dgm:else>
+    </dgm:choose>
+    <dgm:shape xmlns:r="http://schemas.openxmlformats.org/officeDocument/2006/relationships" r:blip="">
+      <dgm:adjLst/>
+    </dgm:shape>
+    <dgm:presOf/>
+    <dgm:constrLst>
+      <dgm:constr type="w" for="ch" forName="horz1" refType="w"/>
+      <dgm:constr type="h" for="ch" forName="horz1" refType="h"/>
+      <dgm:constr type="h" for="des" forName="vert1" refType="h"/>
+      <dgm:constr type="h" for="des" forName="tx1" refType="h"/>
+      <dgm:constr type="h" for="des" forName="horz2" refType="h"/>
+      <dgm:constr type="h" for="des" forName="vert2" refType="h"/>
+      <dgm:constr type="h" for="des" forName="horz3" refType="h"/>
+      <dgm:constr type="h" for="des" forName="vert3" refType="h"/>
+      <dgm:constr type="h" for="des" forName="horz4" refType="h"/>
+      <dgm:constr type="h" for="des" ptType="node" refType="h"/>
+      <dgm:constr type="primFontSz" for="des" forName="tx1" op="equ" val="65"/>
+      <dgm:constr type="primFontSz" for="des" forName="tx2" op="equ" val="65"/>
+      <dgm:constr type="primFontSz" for="des" forName="tx3" op="equ" val="65"/>
+      <dgm:constr type="primFontSz" for="des" forName="tx4" op="equ" val="65"/>
+      <dgm:constr type="w" for="des" forName="thickLine" refType="w"/>
+      <dgm:constr type="h" for="des" forName="thickLine"/>
+      <dgm:constr type="h" for="des" forName="thinLine1"/>
+      <dgm:constr type="h" for="des" forName="thinLine2b"/>
+      <dgm:constr type="h" for="des" forName="thinLine3"/>
+      <dgm:constr type="h" for="des" forName="vertSpace2a" refType="h" fact="0.05"/>
+      <dgm:constr type="h" for="des" forName="vertSpace2b" refType="h" refFor="des" refForName="vertSpace2a"/>
+    </dgm:constrLst>
+    <dgm:forEach name="Name3" axis="ch" ptType="node">
+      <dgm:layoutNode name="thickLine" styleLbl="alignNode1">
+        <dgm:alg type="sp"/>
+        <dgm:shape xmlns:r="http://schemas.openxmlformats.org/officeDocument/2006/relationships" type="line" r:blip="">
+          <dgm:adjLst/>
+        </dgm:shape>
+        <dgm:presOf/>
+      </dgm:layoutNode>
+      <dgm:layoutNode name="horz1">
+        <dgm:choose name="Name4">
+          <dgm:if name="Name5" func="var" arg="dir" op="equ" val="norm">
+            <dgm:alg type="lin">
+              <dgm:param type="linDir" val="fromL"/>
+              <dgm:param type="nodeVertAlign" val="t"/>
+            </dgm:alg>
+          </dgm:if>
+          <dgm:else name="Name6">
+            <dgm:alg type="lin">
+              <dgm:param type="linDir" val="fromR"/>
+              <dgm:param type="nodeVertAlign" val="t"/>
+            </dgm:alg>
+          </dgm:else>
+        </dgm:choose>
+        <dgm:shape xmlns:r="http://schemas.openxmlformats.org/officeDocument/2006/relationships" r:blip="">
+          <dgm:adjLst/>
+        </dgm:shape>
+        <dgm:presOf/>
+        <dgm:choose name="Name7">
+          <dgm:if name="Name8" axis="root des" func="maxDepth" op="equ" val="1">
+            <dgm:constrLst>
+              <dgm:constr type="w" for="ch" forName="tx1" refType="w"/>
+            </dgm:constrLst>
+          </dgm:if>
+          <dgm:if name="Name9" axis="root des" func="maxDepth" op="equ" val="2">
+            <dgm:constrLst>
+              <dgm:constr type="w" for="ch" forName="tx1" refType="w" fact="0.2"/>
+              <dgm:constr type="w" for="des" forName="tx2" refType="w" fact="0.785"/>
+              <dgm:constr type="w" for="des" forName="horzSpace2" refType="w" fact="0.015"/>
+              <dgm:constr type="w" for="des" forName="thinLine2b" refType="w" fact="0.8"/>
+            </dgm:constrLst>
+          </dgm:if>
+          <dgm:if name="Name10" axis="root des" func="maxDepth" op="equ" val="3">
+            <dgm:constrLst>
+              <dgm:constr type="w" for="ch" forName="tx1" refType="w" fact="0.2"/>
+              <dgm:constr type="w" for="des" forName="tx2" refType="w" fact="0.385"/>
+              <dgm:constr type="w" for="des" forName="tx3" refType="w" fact="0.385"/>
+              <dgm:constr type="w" for="des" forName="horzSpace2" refType="w" fact="0.015"/>
+              <dgm:constr type="w" for="des" forName="horzSpace3" refType="w" fact="0.015"/>
+              <dgm:constr type="w" for="des" forName="thinLine2b" refType="w" fact="0.8"/>
+              <dgm:constr type="w" for="des" forName="thinLine3" refType="w" fact="0.385"/>
+            </dgm:constrLst>
+          </dgm:if>
+          <dgm:if name="Name11" axis="root des" func="maxDepth" op="gte" val="4">
+            <dgm:constrLst>
+              <dgm:constr type="w" for="ch" forName="tx1" refType="w" fact="0.2"/>
+              <dgm:constr type="w" for="des" forName="tx2" refType="w" fact="0.2516"/>
+              <dgm:constr type="w" for="des" forName="tx3" refType="w" fact="0.2516"/>
+              <dgm:constr type="w" for="des" forName="tx4" refType="w" fact="0.2516"/>
+              <dgm:constr type="w" for="des" forName="horzSpace2" refType="w" fact="0.015"/>
+              <dgm:constr type="w" for="des" forName="horzSpace3" refType="w" fact="0.015"/>
+              <dgm:constr type="w" for="des" forName="horzSpace4" refType="w" fact="0.015"/>
+              <dgm:constr type="w" for="des" forName="thinLine2b" refType="w" fact="0.8"/>
+              <dgm:constr type="w" for="des" forName="thinLine3" refType="w" fact="0.5332"/>
+            </dgm:constrLst>
+          </dgm:if>
+          <dgm:else name="Name12"/>
+        </dgm:choose>
+        <dgm:layoutNode name="tx1" styleLbl="revTx">
+          <dgm:alg type="tx">
+            <dgm:param type="parTxLTRAlign" val="l"/>
+            <dgm:param type="parTxRTLAlign" val="r"/>
+            <dgm:param type="txAnchorVert" val="t"/>
+          </dgm:alg>
+          <dgm:shape xmlns:r="http://schemas.openxmlformats.org/officeDocument/2006/relationships" type="rect" r:blip="">
+            <dgm:adjLst/>
+          </dgm:shape>
+          <dgm:presOf axis="self"/>
+          <dgm:constrLst>
+            <dgm:constr type="tMarg" refType="primFontSz" fact="0.3"/>
+            <dgm:constr type="bMarg" refType="primFontSz" fact="0.3"/>
+            <dgm:constr type="lMarg" refType="primFontSz" fact="0.3"/>
+            <dgm:constr type="rMarg" refType="primFontSz" fact="0.3"/>
+          </dgm:constrLst>
+          <dgm:ruleLst>
+            <dgm:rule type="primFontSz" val="5" fact="NaN" max="NaN"/>
+          </dgm:ruleLst>
+        </dgm:layoutNode>
+        <dgm:layoutNode name="vert1">
+          <dgm:choose name="Name13">
+            <dgm:if name="Name14" func="var" arg="dir" op="equ" val="norm">
+              <dgm:alg type="lin">
+                <dgm:param type="linDir" val="fromT"/>
+                <dgm:param type="nodeHorzAlign" val="l"/>
+              </dgm:alg>
+            </dgm:if>
+            <dgm:else name="Name15">
+              <dgm:alg type="lin">
+                <dgm:param type="linDir" val="fromT"/>
+                <dgm:param type="nodeHorzAlign" val="r"/>
+              </dgm:alg>
+            </dgm:else>
+          </dgm:choose>
+          <dgm:shape xmlns:r="http://schemas.openxmlformats.org/officeDocument/2006/relationships" r:blip="">
+            <dgm:adjLst/>
+          </dgm:shape>
+          <dgm:presOf/>
+          <dgm:forEach name="Name16" axis="ch" ptType="node">
+            <dgm:choose name="Name17">
+              <dgm:if name="Name18" axis="self" ptType="node" func="pos" op="equ" val="1">
+                <dgm:layoutNode name="vertSpace2a">
+                  <dgm:alg type="sp"/>
+                  <dgm:shape xmlns:r="http://schemas.openxmlformats.org/officeDocument/2006/relationships" r:blip="">
+                    <dgm:adjLst/>
+                  </dgm:shape>
+                  <dgm:presOf/>
+                </dgm:layoutNode>
+              </dgm:if>
+              <dgm:else name="Name19"/>
+            </dgm:choose>
+            <dgm:layoutNode name="horz2">
+              <dgm:choose name="Name20">
+                <dgm:if name="Name21" func="var" arg="dir" op="equ" val="norm">
+                  <dgm:alg type="lin">
+                    <dgm:param type="linDir" val="fromL"/>
+                    <dgm:param type="nodeVertAlign" val="t"/>
+                  </dgm:alg>
+                </dgm:if>
+                <dgm:else name="Name22">
+                  <dgm:alg type="lin">
+                    <dgm:param type="linDir" val="fromR"/>
+                    <dgm:param type="nodeVertAlign" val="t"/>
+                  </dgm:alg>
+                </dgm:else>
+              </dgm:choose>
+              <dgm:shape xmlns:r="http://schemas.openxmlformats.org/officeDocument/2006/relationships" r:blip="">
+                <dgm:adjLst/>
+              </dgm:shape>
+              <dgm:presOf/>
+              <dgm:layoutNode name="horzSpace2">
+                <dgm:alg type="sp"/>
+                <dgm:shape xmlns:r="http://schemas.openxmlformats.org/officeDocument/2006/relationships" r:blip="">
+                  <dgm:adjLst/>
+                </dgm:shape>
+                <dgm:presOf/>
+              </dgm:layoutNode>
+              <dgm:layoutNode name="tx2" styleLbl="revTx">
+                <dgm:alg type="tx">
+                  <dgm:param type="parTxLTRAlign" val="l"/>
+                  <dgm:param type="parTxRTLAlign" val="r"/>
+                  <dgm:param type="txAnchorVert" val="t"/>
+                </dgm:alg>
+                <dgm:shape xmlns:r="http://schemas.openxmlformats.org/officeDocument/2006/relationships" type="rect" r:blip="">
+                  <dgm:adjLst/>
+                </dgm:shape>
+                <dgm:presOf axis="self"/>
+                <dgm:constrLst>
+                  <dgm:constr type="tMarg" refType="primFontSz" fact="0.3"/>
+                  <dgm:constr type="bMarg" refType="primFontSz" fact="0.3"/>
+                  <dgm:constr type="lMarg" refType="primFontSz" fact="0.3"/>
+                  <dgm:constr type="rMarg" refType="primFontSz" fact="0.3"/>
+                </dgm:constrLst>
+                <dgm:ruleLst>
+                  <dgm:rule type="primFontSz" val="5" fact="NaN" max="NaN"/>
+                </dgm:ruleLst>
+              </dgm:layoutNode>
+              <dgm:layoutNode name="vert2">
+                <dgm:choose name="Name23">
+                  <dgm:if name="Name24" func="var" arg="dir" op="equ" val="norm">
+                    <dgm:alg type="lin">
+                      <dgm:param type="linDir" val="fromT"/>
+                      <dgm:param type="nodeHorzAlign" val="l"/>
+                    </dgm:alg>
+                  </dgm:if>
+                  <dgm:else name="Name25">
+                    <dgm:alg type="lin">
+                      <dgm:param type="linDir" val="fromT"/>
+                      <dgm:param type="nodeHorzAlign" val="r"/>
+                    </dgm:alg>
+                  </dgm:else>
+                </dgm:choose>
+                <dgm:shape xmlns:r="http://schemas.openxmlformats.org/officeDocument/2006/relationships" r:blip="">
+                  <dgm:adjLst/>
+                </dgm:shape>
+                <dgm:presOf/>
+                <dgm:forEach name="Name26" axis="ch" ptType="node">
+                  <dgm:layoutNode name="horz3">
+                    <dgm:choose name="Name27">
+                      <dgm:if name="Name28" func="var" arg="dir" op="equ" val="norm">
+                        <dgm:alg type="lin">
+                          <dgm:param type="linDir" val="fromL"/>
+                          <dgm:param type="nodeVertAlign" val="t"/>
+                        </dgm:alg>
+                      </dgm:if>
+                      <dgm:else name="Name29">
+                        <dgm:alg type="lin">
+                          <dgm:param type="linDir" val="fromR"/>
+                          <dgm:param type="nodeVertAlign" val="t"/>
+                        </dgm:alg>
+                      </dgm:else>
+                    </dgm:choose>
+                    <dgm:shape xmlns:r="http://schemas.openxmlformats.org/officeDocument/2006/relationships" r:blip="">
+                      <dgm:adjLst/>
+                    </dgm:shape>
+                    <dgm:presOf/>
+                    <dgm:layoutNode name="horzSpace3">
+                      <dgm:alg type="sp"/>
+                      <dgm:shape xmlns:r="http://schemas.openxmlformats.org/officeDocument/2006/relationships" r:blip="">
+                        <dgm:adjLst/>
+                      </dgm:shape>
+                      <dgm:presOf/>
+                    </dgm:layoutNode>
+                    <dgm:layoutNode name="tx3" styleLbl="revTx">
+                      <dgm:alg type="tx">
+                        <dgm:param type="parTxLTRAlign" val="l"/>
+                        <dgm:param type="parTxRTLAlign" val="r"/>
+                        <dgm:param type="txAnchorVert" val="t"/>
+                      </dgm:alg>
+                      <dgm:shape xmlns:r="http://schemas.openxmlformats.org/officeDocument/2006/relationships" type="rect" r:blip="">
+                        <dgm:adjLst/>
+                      </dgm:shape>
+                      <dgm:presOf axis="self"/>
+                      <dgm:constrLst>
+                        <dgm:constr type="tMarg" refType="primFontSz" fact="0.3"/>
+                        <dgm:constr type="bMarg" refType="primFontSz" fact="0.3"/>
+                        <dgm:constr type="lMarg" refType="primFontSz" fact="0.3"/>
+                        <dgm:constr type="rMarg" refType="primFontSz" fact="0.3"/>
+                      </dgm:constrLst>
+                      <dgm:ruleLst>
+                        <dgm:rule type="primFontSz" val="5" fact="NaN" max="NaN"/>
+                      </dgm:ruleLst>
+                    </dgm:layoutNode>
+                    <dgm:layoutNode name="vert3">
+                      <dgm:choose name="Name30">
+                        <dgm:if name="Name31" func="var" arg="dir" op="equ" val="norm">
+                          <dgm:alg type="lin">
+                            <dgm:param type="linDir" val="fromT"/>
+                            <dgm:param type="nodeHorzAlign" val="l"/>
+                          </dgm:alg>
+                        </dgm:if>
+                        <dgm:else name="Name32">
+                          <dgm:alg type="lin">
+                            <dgm:param type="linDir" val="fromT"/>
+                            <dgm:param type="nodeHorzAlign" val="r"/>
+                          </dgm:alg>
+                        </dgm:else>
+                      </dgm:choose>
+                      <dgm:shape xmlns:r="http://schemas.openxmlformats.org/officeDocument/2006/relationships" r:blip="">
+                        <dgm:adjLst/>
+                      </dgm:shape>
+                      <dgm:presOf/>
+                      <dgm:forEach name="Name33" axis="ch" ptType="node">
+                        <dgm:layoutNode name="horz4">
+                          <dgm:choose name="Name34">
+                            <dgm:if name="Name35" func="var" arg="dir" op="equ" val="norm">
+                              <dgm:alg type="lin">
+                                <dgm:param type="linDir" val="fromL"/>
+                                <dgm:param type="nodeVertAlign" val="t"/>
+                              </dgm:alg>
+                            </dgm:if>
+                            <dgm:else name="Name36">
+                              <dgm:alg type="lin">
+                                <dgm:param type="linDir" val="fromR"/>
+                                <dgm:param type="nodeVertAlign" val="t"/>
+                              </dgm:alg>
+                            </dgm:else>
+                          </dgm:choose>
+                          <dgm:shape xmlns:r="http://schemas.openxmlformats.org/officeDocument/2006/relationships" r:blip="">
+                            <dgm:adjLst/>
+                          </dgm:shape>
+                          <dgm:presOf/>
+                          <dgm:layoutNode name="horzSpace4">
+                            <dgm:alg type="sp"/>
+                            <dgm:shape xmlns:r="http://schemas.openxmlformats.org/officeDocument/2006/relationships" r:blip="">
+                              <dgm:adjLst/>
+                            </dgm:shape>
+                            <dgm:presOf/>
+                          </dgm:layoutNode>
+                          <dgm:layoutNode name="tx4" styleLbl="revTx">
+                            <dgm:varLst>
+                              <dgm:bulletEnabled val="1"/>
+                            </dgm:varLst>
+                            <dgm:alg type="tx">
+                              <dgm:param type="parTxLTRAlign" val="l"/>
+                              <dgm:param type="parTxRTLAlign" val="r"/>
+                              <dgm:param type="txAnchorVert" val="t"/>
+                            </dgm:alg>
+                            <dgm:shape xmlns:r="http://schemas.openxmlformats.org/officeDocument/2006/relationships" type="rect" r:blip="">
+                              <dgm:adjLst/>
+                            </dgm:shape>
+                            <dgm:presOf axis="desOrSelf" ptType="node"/>
+                            <dgm:constrLst>
+                              <dgm:constr type="tMarg" refType="primFontSz" fact="0.3"/>
+                              <dgm:constr type="bMarg" refType="primFontSz" fact="0.3"/>
+                              <dgm:constr type="lMarg" refType="primFontSz" fact="0.3"/>
+                              <dgm:constr type="rMarg" refType="primFontSz" fact="0.3"/>
+                            </dgm:constrLst>
+                            <dgm:ruleLst>
+                              <dgm:rule type="primFontSz" val="5" fact="NaN" max="NaN"/>
+                            </dgm:ruleLst>
+                          </dgm:layoutNode>
+                        </dgm:layoutNode>
+                      </dgm:forEach>
+                    </dgm:layoutNode>
+                  </dgm:layoutNode>
+                  <dgm:forEach name="Name37" axis="followSib" ptType="sibTrans" cnt="1">
+                    <dgm:layoutNode name="thinLine3" styleLbl="callout">
+                      <dgm:alg type="sp"/>
+                      <dgm:shape xmlns:r="http://schemas.openxmlformats.org/officeDocument/2006/relationships" type="line" r:blip="">
+                        <dgm:adjLst/>
+                      </dgm:shape>
+                      <dgm:presOf/>
+                    </dgm:layoutNode>
+                  </dgm:forEach>
+                </dgm:forEach>
+              </dgm:layoutNode>
+            </dgm:layoutNode>
+            <dgm:layoutNode name="thinLine2b" styleLbl="callout">
+              <dgm:alg type="sp"/>
+              <dgm:shape xmlns:r="http://schemas.openxmlformats.org/officeDocument/2006/relationships" type="line" r:blip="">
+                <dgm:adjLst/>
+              </dgm:shape>
+              <dgm:presOf/>
+            </dgm:layoutNode>
+            <dgm:layoutNode name="vertSpace2b">
+              <dgm:alg type="sp"/>
+              <dgm:shape xmlns:r="http://schemas.openxmlformats.org/officeDocument/2006/relationships" r:blip="">
+                <dgm:adjLst/>
+              </dgm:shape>
+              <dgm:presOf/>
+            </dgm:layoutNode>
+          </dgm:forEach>
+        </dgm:layoutNode>
+      </dgm:layoutNode>
+    </dgm:forEach>
+  </dgm:layoutNode>
+</dgm:layoutDef>
+</file>
+
+<file path=ppt/diagrams/quickStyle1.xml><?xml version="1.0" encoding="utf-8"?>
+<dgm:styleDef xmlns:dgm="http://schemas.openxmlformats.org/drawingml/2006/diagram" xmlns:a="http://schemas.openxmlformats.org/drawingml/2006/main" uniqueId="urn:microsoft.com/office/officeart/2005/8/quickstyle/simple4">
+  <dgm:title val=""/>
+  <dgm:desc val=""/>
+  <dgm:catLst>
+    <dgm:cat type="simple" pri="10400"/>
+  </dgm:catLst>
+  <dgm:scene3d>
+    <a:camera prst="orthographicFront"/>
+    <a:lightRig rig="threePt" dir="t"/>
+  </dgm:scene3d>
+  <dgm:styleLbl name="node0">
+    <dgm:scene3d>
+      <a:camera prst="orthographicFront"/>
+      <a:lightRig rig="threePt" dir="t"/>
+    </dgm:scene3d>
+    <dgm:sp3d/>
+    <dgm:txPr/>
+    <dgm:style>
+      <a:lnRef idx="0">
+        <a:scrgbClr r="0" g="0" b="0"/>
+      </a:lnRef>
+      <a:fillRef idx="3">
+        <a:scrgbClr r="0" g="0" b="0"/>
+      </a:fillRef>
+      <a:effectRef idx="2">
+        <a:scrgbClr r="0" g="0" b="0"/>
+      </a:effectRef>
+      <a:fontRef idx="minor">
+        <a:schemeClr val="lt1"/>
+      </a:fontRef>
+    </dgm:style>
+  </dgm:styleLbl>
+  <dgm:styleLbl name="lnNode1">
+    <dgm:scene3d>
+      <a:camera prst="orthographicFront"/>
+      <a:lightRig rig="threePt" dir="t"/>
+    </dgm:scene3d>
+    <dgm:sp3d/>
+    <dgm:txPr/>
+    <dgm:style>
+      <a:lnRef idx="1">
+        <a:scrgbClr r="0" g="0" b="0"/>
+      </a:lnRef>
+      <a:fillRef idx="3">
+        <a:scrgbClr r="0" g="0" b="0"/>
+      </a:fillRef>
+      <a:effectRef idx="2">
+        <a:scrgbClr r="0" g="0" b="0"/>
+      </a:effectRef>
+      <a:fontRef idx="minor">
+        <a:schemeClr val="lt1"/>
+      </a:fontRef>
+    </dgm:style>
+  </dgm:styleLbl>
+  <dgm:styleLbl name="vennNode1">
+    <dgm:scene3d>
+      <a:camera prst="orthographicFront"/>
+      <a:lightRig rig="threePt" dir="t"/>
+    </dgm:scene3d>
+    <dgm:sp3d/>
+    <dgm:txPr/>
+    <dgm:style>
+      <a:lnRef idx="0">
+        <a:scrgbClr r="0" g="0" b="0"/>
+      </a:lnRef>
+      <a:fillRef idx="3">
+        <a:scrgbClr r="0" g="0" b="0"/>
+      </a:fillRef>
+      <a:effectRef idx="0">
+        <a:scrgbClr r="0" g="0" b="0"/>
+      </a:effectRef>
+      <a:fontRef idx="minor">
+        <a:schemeClr val="tx1"/>
+      </a:fontRef>
+    </dgm:style>
+  </dgm:styleLbl>
+  <dgm:styleLbl name="alignNode1">
+    <dgm:scene3d>
+      <a:camera prst="orthographicFront"/>
+      <a:lightRig rig="threePt" dir="t"/>
+    </dgm:scene3d>
+    <dgm:sp3d/>
+    <dgm:txPr/>
+    <dgm:style>
+      <a:lnRef idx="1">
+        <a:scrgbClr r="0" g="0" b="0"/>
+      </a:lnRef>
+      <a:fillRef idx="3">
+        <a:scrgbClr r="0" g="0" b="0"/>
+      </a:fillRef>
+      <a:effectRef idx="2">
+        <a:scrgbClr r="0" g="0" b="0"/>
+      </a:effectRef>
+      <a:fontRef idx="minor">
+        <a:schemeClr val="lt1"/>
+      </a:fontRef>
+    </dgm:style>
+  </dgm:styleLbl>
+  <dgm:styleLbl name="node1">
+    <dgm:scene3d>
+      <a:camera prst="orthographicFront"/>
+      <a:lightRig rig="threePt" dir="t"/>
+    </dgm:scene3d>
+    <dgm:sp3d/>
+    <dgm:txPr/>
+    <dgm:style>
+      <a:lnRef idx="0">
+        <a:scrgbClr r="0" g="0" b="0"/>
+      </a:lnRef>
+      <a:fillRef idx="3">
+        <a:scrgbClr r="0" g="0" b="0"/>
+      </a:fillRef>
+      <a:effectRef idx="2">
+        <a:scrgbClr r="0" g="0" b="0"/>
+      </a:effectRef>
+      <a:fontRef idx="minor">
+        <a:schemeClr val="lt1"/>
+      </a:fontRef>
+    </dgm:style>
+  </dgm:styleLbl>
+  <dgm:styleLbl name="node2">
+    <dgm:scene3d>
+      <a:camera prst="orthographicFront"/>
+      <a:lightRig rig="threePt" dir="t"/>
+    </dgm:scene3d>
+    <dgm:sp3d/>
+    <dgm:txPr/>
+    <dgm:style>
+      <a:lnRef idx="0">
+        <a:scrgbClr r="0" g="0" b="0"/>
+      </a:lnRef>
+      <a:fillRef idx="3">
+        <a:scrgbClr r="0" g="0" b="0"/>
+      </a:fillRef>
+      <a:effectRef idx="2">
+        <a:scrgbClr r="0" g="0" b="0"/>
+      </a:effectRef>
+      <a:fontRef idx="minor">
+        <a:schemeClr val="lt1"/>
+      </a:fontRef>
+    </dgm:style>
+  </dgm:styleLbl>
+  <dgm:styleLbl name="node3">
+    <dgm:scene3d>
+      <a:camera prst="orthographicFront"/>
+      <a:lightRig rig="threePt" dir="t"/>
+    </dgm:scene3d>
+    <dgm:sp3d/>
+    <dgm:txPr/>
+    <dgm:style>
+      <a:lnRef idx="0">
+        <a:scrgbClr r="0" g="0" b="0"/>
+      </a:lnRef>
+      <a:fillRef idx="3">
+        <a:scrgbClr r="0" g="0" b="0"/>
+      </a:fillRef>
+      <a:effectRef idx="2">
+        <a:scrgbClr r="0" g="0" b="0"/>
+      </a:effectRef>
+      <a:fontRef idx="minor">
+        <a:schemeClr val="lt1"/>
+      </a:fontRef>
+    </dgm:style>
+  </dgm:styleLbl>
+  <dgm:styleLbl name="node4">
+    <dgm:scene3d>
+      <a:camera prst="orthographicFront"/>
+      <a:lightRig rig="threePt" dir="t"/>
+    </dgm:scene3d>
+    <dgm:sp3d/>
+    <dgm:txPr/>
+    <dgm:style>
+      <a:lnRef idx="0">
+        <a:scrgbClr r="0" g="0" b="0"/>
+      </a:lnRef>
+      <a:fillRef idx="3">
+        <a:scrgbClr r="0" g="0" b="0"/>
+      </a:fillRef>
+      <a:effectRef idx="2">
+        <a:scrgbClr r="0" g="0" b="0"/>
+      </a:effectRef>
+      <a:fontRef idx="minor">
+        <a:schemeClr val="lt1"/>
+      </a:fontRef>
+    </dgm:style>
+  </dgm:styleLbl>
+  <dgm:styleLbl name="fgImgPlace1">
+    <dgm:scene3d>
+      <a:camera prst="orthographicFront"/>
+      <a:lightRig rig="threePt" dir="t"/>
+    </dgm:scene3d>
+    <dgm:sp3d/>
+    <dgm:txPr/>
+    <dgm:style>
+      <a:lnRef idx="0">
+        <a:scrgbClr r="0" g="0" b="0"/>
+      </a:lnRef>
+      <a:fillRef idx="1">
+        <a:scrgbClr r="0" g="0" b="0"/>
+      </a:fillRef>
+      <a:effectRef idx="2">
+        <a:scrgbClr r="0" g="0" b="0"/>
+      </a:effectRef>
+      <a:fontRef idx="minor"/>
+    </dgm:style>
+  </dgm:styleLbl>
+  <dgm:styleLbl name="alignImgPlace1">
+    <dgm:scene3d>
+      <a:camera prst="orthographicFront"/>
+      <a:lightRig rig="threePt" dir="t"/>
+    </dgm:scene3d>
+    <dgm:sp3d/>
+    <dgm:txPr/>
+    <dgm:style>
+      <a:lnRef idx="0">
+        <a:scrgbClr r="0" g="0" b="0"/>
+      </a:lnRef>
+      <a:fillRef idx="1">
+        <a:scrgbClr r="0" g="0" b="0"/>
+      </a:fillRef>
+      <a:effectRef idx="2">
+        <a:scrgbClr r="0" g="0" b="0"/>
+      </a:effectRef>
+      <a:fontRef idx="minor"/>
+    </dgm:style>
+  </dgm:styleLbl>
+  <dgm:styleLbl name="bgImgPlace1">
+    <dgm:scene3d>
+      <a:camera prst="orthographicFront"/>
+      <a:lightRig rig="threePt" dir="t"/>
+    </dgm:scene3d>
+    <dgm:sp3d/>
+    <dgm:txPr/>
+    <dgm:style>
+      <a:lnRef idx="0">
+        <a:scrgbClr r="0" g="0" b="0"/>
+      </a:lnRef>
+      <a:fillRef idx="1">
+        <a:scrgbClr r="0" g="0" b="0"/>
+      </a:fillRef>
+      <a:effectRef idx="2">
+        <a:scrgbClr r="0" g="0" b="0"/>
+      </a:effectRef>
+      <a:fontRef idx="minor"/>
+    </dgm:style>
+  </dgm:styleLbl>
+  <dgm:styleLbl name="sibTrans2D1">
+    <dgm:scene3d>
+      <a:camera prst="orthographicFront"/>
+      <a:lightRig rig="threePt" dir="t"/>
+    </dgm:scene3d>
+    <dgm:sp3d/>
+    <dgm:txPr/>
+    <dgm:style>
+      <a:lnRef idx="0">
+        <a:scrgbClr r="0" g="0" b="0"/>
+      </a:lnRef>
+      <a:fillRef idx="3">
+        <a:scrgbClr r="0" g="0" b="0"/>
+      </a:fillRef>
+      <a:effectRef idx="2">
+        <a:scrgbClr r="0" g="0" b="0"/>
+      </a:effectRef>
+      <a:fontRef idx="minor">
+        <a:schemeClr val="lt1"/>
+      </a:fontRef>
+    </dgm:style>
+  </dgm:styleLbl>
+  <dgm:styleLbl name="fgSibTrans2D1">
+    <dgm:scene3d>
+      <a:camera prst="orthographicFront"/>
+      <a:lightRig rig="threePt" dir="t"/>
+    </dgm:scene3d>
+    <dgm:sp3d/>
+    <dgm:txPr/>
+    <dgm:style>
+      <a:lnRef idx="0">
+        <a:scrgbClr r="0" g="0" b="0"/>
+      </a:lnRef>
+      <a:fillRef idx="3">
+        <a:scrgbClr r="0" g="0" b="0"/>
+      </a:fillRef>
+      <a:effectRef idx="2">
+        <a:scrgbClr r="0" g="0" b="0"/>
+      </a:effectRef>
+      <a:fontRef idx="minor">
+        <a:schemeClr val="lt1"/>
+      </a:fontRef>
+    </dgm:style>
+  </dgm:styleLbl>
+  <dgm:styleLbl name="bgSibTrans2D1">
+    <dgm:scene3d>
+      <a:camera prst="orthographicFront"/>
+      <a:lightRig rig="threePt" dir="t"/>
+    </dgm:scene3d>
+    <dgm:sp3d/>
+    <dgm:txPr/>
+    <dgm:style>
+      <a:lnRef idx="0">
+        <a:scrgbClr r="0" g="0" b="0"/>
+      </a:lnRef>
+      <a:fillRef idx="3">
+        <a:scrgbClr r="0" g="0" b="0"/>
+      </a:fillRef>
+      <a:effectRef idx="2">
+        <a:scrgbClr r="0" g="0" b="0"/>
+      </a:effectRef>
+      <a:fontRef idx="minor">
+        <a:schemeClr val="lt1"/>
+      </a:fontRef>
+    </dgm:style>
+  </dgm:styleLbl>
+  <dgm:styleLbl name="sibTrans1D1">
+    <dgm:scene3d>
+      <a:camera prst="orthographicFront"/>
+      <a:lightRig rig="threePt" dir="t"/>
+    </dgm:scene3d>
+    <dgm:sp3d/>
+    <dgm:txPr/>
+    <dgm:style>
+      <a:lnRef idx="1">
+        <a:scrgbClr r="0" g="0" b="0"/>
+      </a:lnRef>
+      <a:fillRef idx="0">
+        <a:scrgbClr r="0" g="0" b="0"/>
+      </a:fillRef>
+      <a:effectRef idx="0">
+        <a:scrgbClr r="0" g="0" b="0"/>
+      </a:effectRef>
+      <a:fontRef idx="minor"/>
+    </dgm:style>
+  </dgm:styleLbl>
+  <dgm:styleLbl name="callout">
+    <dgm:scene3d>
+      <a:camera prst="orthographicFront"/>
+      <a:lightRig rig="threePt" dir="t"/>
+    </dgm:scene3d>
+    <dgm:sp3d/>
+    <dgm:txPr/>
+    <dgm:style>
+      <a:lnRef idx="2">
+        <a:scrgbClr r="0" g="0" b="0"/>
+      </a:lnRef>
+      <a:fillRef idx="1">
+        <a:scrgbClr r="0" g="0" b="0"/>
+      </a:fillRef>
+      <a:effectRef idx="1">
+        <a:scrgbClr r="0" g="0" b="0"/>
+      </a:effectRef>
+      <a:fontRef idx="minor"/>
+    </dgm:style>
+  </dgm:styleLbl>
+  <dgm:styleLbl name="asst0">
+    <dgm:scene3d>
+      <a:camera prst="orthographicFront"/>
+      <a:lightRig rig="threePt" dir="t"/>
+    </dgm:scene3d>
+    <dgm:sp3d/>
+    <dgm:txPr/>
+    <dgm:style>
+      <a:lnRef idx="0">
+        <a:scrgbClr r="0" g="0" b="0"/>
+      </a:lnRef>
+      <a:fillRef idx="3">
+        <a:scrgbClr r="0" g="0" b="0"/>
+      </a:fillRef>
+      <a:effectRef idx="2">
+        <a:scrgbClr r="0" g="0" b="0"/>
+      </a:effectRef>
+      <a:fontRef idx="minor">
+        <a:schemeClr val="lt1"/>
+      </a:fontRef>
+    </dgm:style>
+  </dgm:styleLbl>
+  <dgm:styleLbl name="asst1">
+    <dgm:scene3d>
+      <a:camera prst="orthographicFront"/>
+      <a:lightRig rig="threePt" dir="t"/>
+    </dgm:scene3d>
+    <dgm:sp3d/>
+    <dgm:txPr/>
+    <dgm:style>
+      <a:lnRef idx="0">
+        <a:scrgbClr r="0" g="0" b="0"/>
+      </a:lnRef>
+      <a:fillRef idx="3">
+        <a:scrgbClr r="0" g="0" b="0"/>
+      </a:fillRef>
+      <a:effectRef idx="2">
+        <a:scrgbClr r="0" g="0" b="0"/>
+      </a:effectRef>
+      <a:fontRef idx="minor">
+        <a:schemeClr val="lt1"/>
+      </a:fontRef>
+    </dgm:style>
+  </dgm:styleLbl>
+  <dgm:styleLbl name="asst2">
+    <dgm:scene3d>
+      <a:camera prst="orthographicFront"/>
+      <a:lightRig rig="threePt" dir="t"/>
+    </dgm:scene3d>
+    <dgm:sp3d/>
+    <dgm:txPr/>
+    <dgm:style>
+      <a:lnRef idx="0">
+        <a:scrgbClr r="0" g="0" b="0"/>
+      </a:lnRef>
+      <a:fillRef idx="3">
+        <a:scrgbClr r="0" g="0" b="0"/>
+      </a:fillRef>
+      <a:effectRef idx="2">
+        <a:scrgbClr r="0" g="0" b="0"/>
+      </a:effectRef>
+      <a:fontRef idx="minor">
+        <a:schemeClr val="lt1"/>
+      </a:fontRef>
+    </dgm:style>
+  </dgm:styleLbl>
+  <dgm:styleLbl name="asst3">
+    <dgm:scene3d>
+      <a:camera prst="orthographicFront"/>
+      <a:lightRig rig="threePt" dir="t"/>
+    </dgm:scene3d>
+    <dgm:sp3d/>
+    <dgm:txPr/>
+    <dgm:style>
+      <a:lnRef idx="0">
+        <a:scrgbClr r="0" g="0" b="0"/>
+      </a:lnRef>
+      <a:fillRef idx="3">
+        <a:scrgbClr r="0" g="0" b="0"/>
+      </a:fillRef>
+      <a:effectRef idx="2">
+        <a:scrgbClr r="0" g="0" b="0"/>
+      </a:effectRef>
+      <a:fontRef idx="minor">
+        <a:schemeClr val="lt1"/>
+      </a:fontRef>
+    </dgm:style>
+  </dgm:styleLbl>
+  <dgm:styleLbl name="asst4">
+    <dgm:scene3d>
+      <a:camera prst="orthographicFront"/>
+      <a:lightRig rig="threePt" dir="t"/>
+    </dgm:scene3d>
+    <dgm:sp3d/>
+    <dgm:txPr/>
+    <dgm:style>
+      <a:lnRef idx="0">
+        <a:scrgbClr r="0" g="0" b="0"/>
+      </a:lnRef>
+      <a:fillRef idx="3">
+        <a:scrgbClr r="0" g="0" b="0"/>
+      </a:fillRef>
+      <a:effectRef idx="2">
+        <a:scrgbClr r="0" g="0" b="0"/>
+      </a:effectRef>
+      <a:fontRef idx="minor">
+        <a:schemeClr val="lt1"/>
+      </a:fontRef>
+    </dgm:style>
+  </dgm:styleLbl>
+  <dgm:styleLbl name="parChTrans2D1">
+    <dgm:scene3d>
+      <a:camera prst="orthographicFront"/>
+      <a:lightRig rig="threePt" dir="t"/>
+    </dgm:scene3d>
+    <dgm:sp3d/>
+    <dgm:txPr/>
+    <dgm:style>
+      <a:lnRef idx="0">
+        <a:scrgbClr r="0" g="0" b="0"/>
+      </a:lnRef>
+      <a:fillRef idx="3">
+        <a:scrgbClr r="0" g="0" b="0"/>
+      </a:fillRef>
+      <a:effectRef idx="2">
+        <a:scrgbClr r="0" g="0" b="0"/>
+      </a:effectRef>
+      <a:fontRef idx="minor">
+        <a:schemeClr val="lt1"/>
+      </a:fontRef>
+    </dgm:style>
+  </dgm:styleLbl>
+  <dgm:styleLbl name="parChTrans2D2">
+    <dgm:scene3d>
+      <a:camera prst="orthographicFront"/>
+      <a:lightRig rig="threePt" dir="t"/>
+    </dgm:scene3d>
+    <dgm:sp3d/>
+    <dgm:txPr/>
+    <dgm:style>
+      <a:lnRef idx="0">
+        <a:scrgbClr r="0" g="0" b="0"/>
+      </a:lnRef>
+      <a:fillRef idx="3">
+        <a:scrgbClr r="0" g="0" b="0"/>
+      </a:fillRef>
+      <a:effectRef idx="2">
+        <a:scrgbClr r="0" g="0" b="0"/>
+      </a:effectRef>
+      <a:fontRef idx="minor">
+        <a:schemeClr val="lt1"/>
+      </a:fontRef>
+    </dgm:style>
+  </dgm:styleLbl>
+  <dgm:styleLbl name="parChTrans2D3">
+    <dgm:scene3d>
+      <a:camera prst="orthographicFront"/>
+      <a:lightRig rig="threePt" dir="t"/>
+    </dgm:scene3d>
+    <dgm:sp3d/>
+    <dgm:txPr/>
+    <dgm:style>
+      <a:lnRef idx="1">
+        <a:scrgbClr r="0" g="0" b="0"/>
+      </a:lnRef>
+      <a:fillRef idx="3">
+        <a:scrgbClr r="0" g="0" b="0"/>
+      </a:fillRef>
+      <a:effectRef idx="2">
+        <a:scrgbClr r="0" g="0" b="0"/>
+      </a:effectRef>
+      <a:fontRef idx="minor">
+        <a:schemeClr val="lt1"/>
+      </a:fontRef>
+    </dgm:style>
+  </dgm:styleLbl>
+  <dgm:styleLbl name="parChTrans2D4">
+    <dgm:scene3d>
+      <a:camera prst="orthographicFront"/>
+      <a:lightRig rig="threePt" dir="t"/>
+    </dgm:scene3d>
+    <dgm:sp3d/>
+    <dgm:txPr/>
+    <dgm:style>
+      <a:lnRef idx="1">
+        <a:scrgbClr r="0" g="0" b="0"/>
+      </a:lnRef>
+      <a:fillRef idx="3">
+        <a:scrgbClr r="0" g="0" b="0"/>
+      </a:fillRef>
+      <a:effectRef idx="2">
+        <a:scrgbClr r="0" g="0" b="0"/>
+      </a:effectRef>
+      <a:fontRef idx="minor">
+        <a:schemeClr val="lt1"/>
+      </a:fontRef>
+    </dgm:style>
+  </dgm:styleLbl>
+  <dgm:styleLbl name="parChTrans1D1">
+    <dgm:scene3d>
+      <a:camera prst="orthographicFront"/>
+      <a:lightRig rig="threePt" dir="t"/>
+    </dgm:scene3d>
+    <dgm:sp3d/>
+    <dgm:txPr/>
+    <dgm:style>
+      <a:lnRef idx="1">
+        <a:scrgbClr r="0" g="0" b="0"/>
+      </a:lnRef>
+      <a:fillRef idx="0">
+        <a:scrgbClr r="0" g="0" b="0"/>
+      </a:fillRef>
+      <a:effectRef idx="0">
+        <a:scrgbClr r="0" g="0" b="0"/>
+      </a:effectRef>
+      <a:fontRef idx="minor"/>
+    </dgm:style>
+  </dgm:styleLbl>
+  <dgm:styleLbl name="parChTrans1D2">
+    <dgm:scene3d>
+      <a:camera prst="orthographicFront"/>
+      <a:lightRig rig="threePt" dir="t"/>
+    </dgm:scene3d>
+    <dgm:sp3d/>
+    <dgm:txPr/>
+    <dgm:style>
+      <a:lnRef idx="1">
+        <a:scrgbClr r="0" g="0" b="0"/>
+      </a:lnRef>
+      <a:fillRef idx="0">
+        <a:scrgbClr r="0" g="0" b="0"/>
+      </a:fillRef>
+      <a:effectRef idx="0">
+        <a:scrgbClr r="0" g="0" b="0"/>
+      </a:effectRef>
+      <a:fontRef idx="minor"/>
+    </dgm:style>
+  </dgm:styleLbl>
+  <dgm:styleLbl name="parChTrans1D3">
+    <dgm:scene3d>
+      <a:camera prst="orthographicFront"/>
+      <a:lightRig rig="threePt" dir="t"/>
+    </dgm:scene3d>
+    <dgm:sp3d/>
+    <dgm:txPr/>
+    <dgm:style>
+      <a:lnRef idx="1">
+        <a:scrgbClr r="0" g="0" b="0"/>
+      </a:lnRef>
+      <a:fillRef idx="0">
+        <a:scrgbClr r="0" g="0" b="0"/>
+      </a:fillRef>
+      <a:effectRef idx="0">
+        <a:scrgbClr r="0" g="0" b="0"/>
+      </a:effectRef>
+      <a:fontRef idx="minor"/>
+    </dgm:style>
+  </dgm:styleLbl>
+  <dgm:styleLbl name="parChTrans1D4">
+    <dgm:scene3d>
+      <a:camera prst="orthographicFront"/>
+      <a:lightRig rig="threePt" dir="t"/>
+    </dgm:scene3d>
+    <dgm:sp3d/>
+    <dgm:txPr/>
+    <dgm:style>
+      <a:lnRef idx="1">
+        <a:scrgbClr r="0" g="0" b="0"/>
+      </a:lnRef>
+      <a:fillRef idx="0">
+        <a:scrgbClr r="0" g="0" b="0"/>
+      </a:fillRef>
+      <a:effectRef idx="0">
+        <a:scrgbClr r="0" g="0" b="0"/>
+      </a:effectRef>
+      <a:fontRef idx="minor"/>
+    </dgm:style>
+  </dgm:styleLbl>
+  <dgm:styleLbl name="fgAcc1">
+    <dgm:scene3d>
+      <a:camera prst="orthographicFront"/>
+      <a:lightRig rig="threePt" dir="t"/>
+    </dgm:scene3d>
+    <dgm:sp3d/>
+    <dgm:txPr/>
+    <dgm:style>
+      <a:lnRef idx="1">
+        <a:scrgbClr r="0" g="0" b="0"/>
+      </a:lnRef>
+      <a:fillRef idx="1">
+        <a:scrgbClr r="0" g="0" b="0"/>
+      </a:fillRef>
+      <a:effectRef idx="0">
+        <a:scrgbClr r="0" g="0" b="0"/>
+      </a:effectRef>
+      <a:fontRef idx="minor"/>
+    </dgm:style>
+  </dgm:styleLbl>
+  <dgm:styleLbl name="conFgAcc1">
+    <dgm:scene3d>
+      <a:camera prst="orthographicFront"/>
+      <a:lightRig rig="threePt" dir="t"/>
+    </dgm:scene3d>
+    <dgm:sp3d/>
+    <dgm:txPr/>
+    <dgm:style>
+      <a:lnRef idx="1">
+        <a:scrgbClr r="0" g="0" b="0"/>
+      </a:lnRef>
+      <a:fillRef idx="1">
+        <a:scrgbClr r="0" g="0" b="0"/>
+      </a:fillRef>
+      <a:effectRef idx="0">
+        <a:scrgbClr r="0" g="0" b="0"/>
+      </a:effectRef>
+      <a:fontRef idx="minor"/>
+    </dgm:style>
+  </dgm:styleLbl>
+  <dgm:styleLbl name="alignAcc1">
+    <dgm:scene3d>
+      <a:camera prst="orthographicFront"/>
+      <a:lightRig rig="threePt" dir="t"/>
+    </dgm:scene3d>
+    <dgm:sp3d/>
+    <dgm:txPr/>
+    <dgm:style>
+      <a:lnRef idx="1">
+        <a:scrgbClr r="0" g="0" b="0"/>
+      </a:lnRef>
+      <a:fillRef idx="1">
+        <a:scrgbClr r="0" g="0" b="0"/>
+      </a:fillRef>
+      <a:effectRef idx="0">
+        <a:scrgbClr r="0" g="0" b="0"/>
+      </a:effectRef>
+      <a:fontRef idx="minor"/>
+    </dgm:style>
+  </dgm:styleLbl>
+  <dgm:styleLbl name="trAlignAcc1">
+    <dgm:scene3d>
+      <a:camera prst="orthographicFront"/>
+      <a:lightRig rig="threePt" dir="t"/>
+    </dgm:scene3d>
+    <dgm:sp3d/>
+    <dgm:txPr/>
+    <dgm:style>
+      <a:lnRef idx="1">
+        <a:scrgbClr r="0" g="0" b="0"/>
+      </a:lnRef>
+      <a:fillRef idx="1">
+        <a:scrgbClr r="0" g="0" b="0"/>
+      </a:fillRef>
+      <a:effectRef idx="0">
+        <a:scrgbClr r="0" g="0" b="0"/>
+      </a:effectRef>
+      <a:fontRef idx="minor"/>
+    </dgm:style>
+  </dgm:styleLbl>
+  <dgm:styleLbl name="bgAcc1">
+    <dgm:scene3d>
+      <a:camera prst="orthographicFront"/>
+      <a:lightRig rig="threePt" dir="t"/>
+    </dgm:scene3d>
+    <dgm:sp3d/>
+    <dgm:txPr/>
+    <dgm:style>
+      <a:lnRef idx="1">
+        <a:scrgbClr r="0" g="0" b="0"/>
+      </a:lnRef>
+      <a:fillRef idx="1">
+        <a:scrgbClr r="0" g="0" b="0"/>
+      </a:fillRef>
+      <a:effectRef idx="0">
+        <a:scrgbClr r="0" g="0" b="0"/>
+      </a:effectRef>
+      <a:fontRef idx="minor"/>
+    </dgm:style>
+  </dgm:styleLbl>
+  <dgm:styleLbl name="solidFgAcc1">
+    <dgm:scene3d>
+      <a:camera prst="orthographicFront"/>
+      <a:lightRig rig="threePt" dir="t"/>
+    </dgm:scene3d>
+    <dgm:sp3d/>
+    <dgm:txPr/>
+    <dgm:style>
+      <a:lnRef idx="1">
+        <a:scrgbClr r="0" g="0" b="0"/>
+      </a:lnRef>
+      <a:fillRef idx="1">
+        <a:scrgbClr r="0" g="0" b="0"/>
+      </a:fillRef>
+      <a:effectRef idx="0">
+        <a:scrgbClr r="0" g="0" b="0"/>
+      </a:effectRef>
+      <a:fontRef idx="minor"/>
+    </dgm:style>
+  </dgm:styleLbl>
+  <dgm:styleLbl name="solidAlignAcc1">
+    <dgm:scene3d>
+      <a:camera prst="orthographicFront"/>
+      <a:lightRig rig="threePt" dir="t"/>
+    </dgm:scene3d>
+    <dgm:sp3d/>
+    <dgm:txPr/>
+    <dgm:style>
+      <a:lnRef idx="1">
+        <a:scrgbClr r="0" g="0" b="0"/>
+      </a:lnRef>
+      <a:fillRef idx="1">
+        <a:scrgbClr r="0" g="0" b="0"/>
+      </a:fillRef>
+      <a:effectRef idx="0">
+        <a:scrgbClr r="0" g="0" b="0"/>
+      </a:effectRef>
+      <a:fontRef idx="minor"/>
+    </dgm:style>
+  </dgm:styleLbl>
+  <dgm:styleLbl name="solidBgAcc1">
+    <dgm:scene3d>
+      <a:camera prst="orthographicFront"/>
+      <a:lightRig rig="threePt" dir="t"/>
+    </dgm:scene3d>
+    <dgm:sp3d/>
+    <dgm:txPr/>
+    <dgm:style>
+      <a:lnRef idx="1">
+        <a:scrgbClr r="0" g="0" b="0"/>
+      </a:lnRef>
+      <a:fillRef idx="1">
+        <a:scrgbClr r="0" g="0" b="0"/>
+      </a:fillRef>
+      <a:effectRef idx="0">
+        <a:scrgbClr r="0" g="0" b="0"/>
+      </a:effectRef>
+      <a:fontRef idx="minor"/>
+    </dgm:style>
+  </dgm:styleLbl>
+  <dgm:styleLbl name="fgAccFollowNode1">
+    <dgm:scene3d>
+      <a:camera prst="orthographicFront"/>
+      <a:lightRig rig="threePt" dir="t"/>
+    </dgm:scene3d>
+    <dgm:sp3d/>
+    <dgm:txPr/>
+    <dgm:style>
+      <a:lnRef idx="1">
+        <a:scrgbClr r="0" g="0" b="0"/>
+      </a:lnRef>
+      <a:fillRef idx="1">
+        <a:scrgbClr r="0" g="0" b="0"/>
+      </a:fillRef>
+      <a:effectRef idx="0">
+        <a:scrgbClr r="0" g="0" b="0"/>
+      </a:effectRef>
+      <a:fontRef idx="minor"/>
+    </dgm:style>
+  </dgm:styleLbl>
+  <dgm:styleLbl name="alignAccFollowNode1">
+    <dgm:scene3d>
+      <a:camera prst="orthographicFront"/>
+      <a:lightRig rig="threePt" dir="t"/>
+    </dgm:scene3d>
+    <dgm:sp3d/>
+    <dgm:txPr/>
+    <dgm:style>
+      <a:lnRef idx="1">
+        <a:scrgbClr r="0" g="0" b="0"/>
+      </a:lnRef>
+      <a:fillRef idx="1">
+        <a:scrgbClr r="0" g="0" b="0"/>
+      </a:fillRef>
+      <a:effectRef idx="0">
+        <a:scrgbClr r="0" g="0" b="0"/>
+      </a:effectRef>
+      <a:fontRef idx="minor"/>
+    </dgm:style>
+  </dgm:styleLbl>
+  <dgm:styleLbl name="bgAccFollowNode1">
+    <dgm:scene3d>
+      <a:camera prst="orthographicFront"/>
+      <a:lightRig rig="threePt" dir="t"/>
+    </dgm:scene3d>
+    <dgm:sp3d/>
+    <dgm:txPr/>
+    <dgm:style>
+      <a:lnRef idx="1">
+        <a:scrgbClr r="0" g="0" b="0"/>
+      </a:lnRef>
+      <a:fillRef idx="1">
+        <a:scrgbClr r="0" g="0" b="0"/>
+      </a:fillRef>
+      <a:effectRef idx="0">
+        <a:scrgbClr r="0" g="0" b="0"/>
+      </a:effectRef>
+      <a:fontRef idx="minor"/>
+    </dgm:style>
+  </dgm:styleLbl>
+  <dgm:styleLbl name="fgAcc0">
+    <dgm:scene3d>
+      <a:camera prst="orthographicFront"/>
+      <a:lightRig rig="threePt" dir="t"/>
+    </dgm:scene3d>
+    <dgm:sp3d/>
+    <dgm:txPr/>
+    <dgm:style>
+      <a:lnRef idx="1">
+        <a:scrgbClr r="0" g="0" b="0"/>
+      </a:lnRef>
+      <a:fillRef idx="1">
+        <a:scrgbClr r="0" g="0" b="0"/>
+      </a:fillRef>
+      <a:effectRef idx="0">
+        <a:scrgbClr r="0" g="0" b="0"/>
+      </a:effectRef>
+      <a:fontRef idx="minor"/>
+    </dgm:style>
+  </dgm:styleLbl>
+  <dgm:styleLbl name="fgAcc2">
+    <dgm:scene3d>
+      <a:camera prst="orthographicFront"/>
+      <a:lightRig rig="threePt" dir="t"/>
+    </dgm:scene3d>
+    <dgm:sp3d/>
+    <dgm:txPr/>
+    <dgm:style>
+      <a:lnRef idx="1">
+        <a:scrgbClr r="0" g="0" b="0"/>
+      </a:lnRef>
+      <a:fillRef idx="1">
+        <a:scrgbClr r="0" g="0" b="0"/>
+      </a:fillRef>
+      <a:effectRef idx="0">
+        <a:scrgbClr r="0" g="0" b="0"/>
+      </a:effectRef>
+      <a:fontRef idx="minor"/>
+    </dgm:style>
+  </dgm:styleLbl>
+  <dgm:styleLbl name="fgAcc3">
+    <dgm:scene3d>
+      <a:camera prst="orthographicFront"/>
+      <a:lightRig rig="threePt" dir="t"/>
+    </dgm:scene3d>
+    <dgm:sp3d/>
+    <dgm:txPr/>
+    <dgm:style>
+      <a:lnRef idx="1">
+        <a:scrgbClr r="0" g="0" b="0"/>
+      </a:lnRef>
+      <a:fillRef idx="1">
+        <a:scrgbClr r="0" g="0" b="0"/>
+      </a:fillRef>
+      <a:effectRef idx="0">
+        <a:scrgbClr r="0" g="0" b="0"/>
+      </a:effectRef>
+      <a:fontRef idx="minor"/>
+    </dgm:style>
+  </dgm:styleLbl>
+  <dgm:styleLbl name="fgAcc4">
+    <dgm:scene3d>
+      <a:camera prst="orthographicFront"/>
+      <a:lightRig rig="threePt" dir="t"/>
+    </dgm:scene3d>
+    <dgm:sp3d/>
+    <dgm:txPr/>
+    <dgm:style>
+      <a:lnRef idx="1">
+        <a:scrgbClr r="0" g="0" b="0"/>
+      </a:lnRef>
+      <a:fillRef idx="1">
+        <a:scrgbClr r="0" g="0" b="0"/>
+      </a:fillRef>
+      <a:effectRef idx="0">
+        <a:scrgbClr r="0" g="0" b="0"/>
+      </a:effectRef>
+      <a:fontRef idx="minor"/>
+    </dgm:style>
+  </dgm:styleLbl>
+  <dgm:styleLbl name="bgShp">
+    <dgm:scene3d>
+      <a:camera prst="orthographicFront"/>
+      <a:lightRig rig="threePt" dir="t"/>
+    </dgm:scene3d>
+    <dgm:sp3d/>
+    <dgm:txPr/>
+    <dgm:style>
+      <a:lnRef idx="0">
+        <a:scrgbClr r="0" g="0" b="0"/>
+      </a:lnRef>
+      <a:fillRef idx="1">
+        <a:scrgbClr r="0" g="0" b="0"/>
+      </a:fillRef>
+      <a:effectRef idx="2">
+        <a:scrgbClr r="0" g="0" b="0"/>
+      </a:effectRef>
+      <a:fontRef idx="minor"/>
+    </dgm:style>
+  </dgm:styleLbl>
+  <dgm:styleLbl name="dkBgShp">
+    <dgm:scene3d>
+      <a:camera prst="orthographicFront"/>
+      <a:lightRig rig="threePt" dir="t"/>
+    </dgm:scene3d>
+    <dgm:sp3d/>
+    <dgm:txPr/>
+    <dgm:style>
+      <a:lnRef idx="0">
+        <a:scrgbClr r="0" g="0" b="0"/>
+      </a:lnRef>
+      <a:fillRef idx="1">
+        <a:scrgbClr r="0" g="0" b="0"/>
+      </a:fillRef>
+      <a:effectRef idx="2">
+        <a:scrgbClr r="0" g="0" b="0"/>
+      </a:effectRef>
+      <a:fontRef idx="minor"/>
+    </dgm:style>
+  </dgm:styleLbl>
+  <dgm:styleLbl name="trBgShp">
+    <dgm:scene3d>
+      <a:camera prst="orthographicFront"/>
+      <a:lightRig rig="threePt" dir="t"/>
+    </dgm:scene3d>
+    <dgm:sp3d/>
+    <dgm:txPr/>
+    <dgm:style>
+      <a:lnRef idx="0">
+        <a:scrgbClr r="0" g="0" b="0"/>
+      </a:lnRef>
+      <a:fillRef idx="1">
+        <a:scrgbClr r="0" g="0" b="0"/>
+      </a:fillRef>
+      <a:effectRef idx="0">
+        <a:scrgbClr r="0" g="0" b="0"/>
+      </a:effectRef>
+      <a:fontRef idx="minor"/>
+    </dgm:style>
+  </dgm:styleLbl>
+  <dgm:styleLbl name="fgShp">
+    <dgm:scene3d>
+      <a:camera prst="orthographicFront"/>
+      <a:lightRig rig="threePt" dir="t"/>
+    </dgm:scene3d>
+    <dgm:sp3d/>
+    <dgm:txPr/>
+    <dgm:style>
+      <a:lnRef idx="0">
+        <a:scrgbClr r="0" g="0" b="0"/>
+      </a:lnRef>
+      <a:fillRef idx="3">
+        <a:scrgbClr r="0" g="0" b="0"/>
+      </a:fillRef>
+      <a:effectRef idx="2">
+        <a:scrgbClr r="0" g="0" b="0"/>
+      </a:effectRef>
+      <a:fontRef idx="minor"/>
+    </dgm:style>
+  </dgm:styleLbl>
+  <dgm:styleLbl name="revTx">
+    <dgm:scene3d>
+      <a:camera prst="orthographicFront"/>
+      <a:lightRig rig="threePt" dir="t"/>
+    </dgm:scene3d>
+    <dgm:sp3d/>
+    <dgm:txPr/>
+    <dgm:style>
+      <a:lnRef idx="0">
+        <a:scrgbClr r="0" g="0" b="0"/>
+      </a:lnRef>
+      <a:fillRef idx="0">
+        <a:scrgbClr r="0" g="0" b="0"/>
+      </a:fillRef>
+      <a:effectRef idx="0">
+        <a:scrgbClr r="0" g="0" b="0"/>
+      </a:effectRef>
+      <a:fontRef idx="minor"/>
+    </dgm:style>
+  </dgm:styleLbl>
+</dgm:styleDef>
+</file>
+
 <file path=ppt/notesMasters/notesMaster1.xml><?xml version="1.0" encoding="utf-8"?>
 <p:notesMaster xmlns:a="http://schemas.openxmlformats.org/drawingml/2006/main" xmlns:r="http://schemas.openxmlformats.org/officeDocument/2006/relationships" xmlns:p="http://schemas.openxmlformats.org/presentationml/2006/main">
   <p:cSld>
@@ -223,7 +3323,7 @@
           <a:p>
             <a:fld id="{7358CC29-445E-4375-84FA-A1290C1DFF7E}" type="datetimeFigureOut">
               <a:rPr lang="en-US" smtClean="0"/>
-              <a:t>2/1/2023</a:t>
+              <a:t>23/02/2023</a:t>
             </a:fld>
             <a:endParaRPr lang="en-US"/>
           </a:p>
@@ -843,7 +3943,7 @@
           <a:p>
             <a:fld id="{0653D66D-8F7F-4D89-96F6-686A96BDA468}" type="datetimeFigureOut">
               <a:rPr lang="en-US" smtClean="0"/>
-              <a:t>2/1/2023</a:t>
+              <a:t>23/02/2023</a:t>
             </a:fld>
             <a:endParaRPr lang="en-US"/>
           </a:p>
@@ -1141,7 +4241,7 @@
           <a:p>
             <a:fld id="{0653D66D-8F7F-4D89-96F6-686A96BDA468}" type="datetimeFigureOut">
               <a:rPr lang="en-US" smtClean="0"/>
-              <a:t>2/1/2023</a:t>
+              <a:t>23/02/2023</a:t>
             </a:fld>
             <a:endParaRPr lang="en-US"/>
           </a:p>
@@ -1333,7 +4433,7 @@
           <a:p>
             <a:fld id="{0653D66D-8F7F-4D89-96F6-686A96BDA468}" type="datetimeFigureOut">
               <a:rPr lang="en-US" smtClean="0"/>
-              <a:t>2/1/2023</a:t>
+              <a:t>23/02/2023</a:t>
             </a:fld>
             <a:endParaRPr lang="en-US"/>
           </a:p>
@@ -1594,7 +4694,7 @@
           <a:p>
             <a:fld id="{0653D66D-8F7F-4D89-96F6-686A96BDA468}" type="datetimeFigureOut">
               <a:rPr lang="en-US" smtClean="0"/>
-              <a:t>2/1/2023</a:t>
+              <a:t>23/02/2023</a:t>
             </a:fld>
             <a:endParaRPr lang="en-US"/>
           </a:p>
@@ -2018,7 +5118,7 @@
           <a:p>
             <a:fld id="{0653D66D-8F7F-4D89-96F6-686A96BDA468}" type="datetimeFigureOut">
               <a:rPr lang="en-US" smtClean="0"/>
-              <a:t>2/1/2023</a:t>
+              <a:t>23/02/2023</a:t>
             </a:fld>
             <a:endParaRPr lang="en-US"/>
           </a:p>
@@ -2555,7 +5655,7 @@
           <a:p>
             <a:fld id="{0653D66D-8F7F-4D89-96F6-686A96BDA468}" type="datetimeFigureOut">
               <a:rPr lang="en-US" smtClean="0"/>
-              <a:t>2/1/2023</a:t>
+              <a:t>23/02/2023</a:t>
             </a:fld>
             <a:endParaRPr lang="en-US"/>
           </a:p>
@@ -3419,7 +6519,7 @@
           <a:p>
             <a:fld id="{0653D66D-8F7F-4D89-96F6-686A96BDA468}" type="datetimeFigureOut">
               <a:rPr lang="en-US" smtClean="0"/>
-              <a:t>2/1/2023</a:t>
+              <a:t>23/02/2023</a:t>
             </a:fld>
             <a:endParaRPr lang="en-US"/>
           </a:p>
@@ -3589,7 +6689,7 @@
           <a:p>
             <a:fld id="{0653D66D-8F7F-4D89-96F6-686A96BDA468}" type="datetimeFigureOut">
               <a:rPr lang="en-US" smtClean="0"/>
-              <a:t>2/1/2023</a:t>
+              <a:t>23/02/2023</a:t>
             </a:fld>
             <a:endParaRPr lang="en-US"/>
           </a:p>
@@ -3773,7 +6873,7 @@
           <a:p>
             <a:fld id="{0653D66D-8F7F-4D89-96F6-686A96BDA468}" type="datetimeFigureOut">
               <a:rPr lang="en-US" smtClean="0"/>
-              <a:t>2/1/2023</a:t>
+              <a:t>23/02/2023</a:t>
             </a:fld>
             <a:endParaRPr lang="en-US"/>
           </a:p>
@@ -3943,7 +7043,7 @@
           <a:p>
             <a:fld id="{0653D66D-8F7F-4D89-96F6-686A96BDA468}" type="datetimeFigureOut">
               <a:rPr lang="en-US" smtClean="0"/>
-              <a:t>2/1/2023</a:t>
+              <a:t>23/02/2023</a:t>
             </a:fld>
             <a:endParaRPr lang="en-US"/>
           </a:p>
@@ -4187,7 +7287,7 @@
           <a:p>
             <a:fld id="{0653D66D-8F7F-4D89-96F6-686A96BDA468}" type="datetimeFigureOut">
               <a:rPr lang="en-US" smtClean="0"/>
-              <a:t>2/1/2023</a:t>
+              <a:t>23/02/2023</a:t>
             </a:fld>
             <a:endParaRPr lang="en-US"/>
           </a:p>
@@ -4423,7 +7523,7 @@
           <a:p>
             <a:fld id="{0653D66D-8F7F-4D89-96F6-686A96BDA468}" type="datetimeFigureOut">
               <a:rPr lang="en-US" smtClean="0"/>
-              <a:t>2/1/2023</a:t>
+              <a:t>23/02/2023</a:t>
             </a:fld>
             <a:endParaRPr lang="en-US"/>
           </a:p>
@@ -4889,7 +7989,7 @@
           <a:p>
             <a:fld id="{0653D66D-8F7F-4D89-96F6-686A96BDA468}" type="datetimeFigureOut">
               <a:rPr lang="en-US" smtClean="0"/>
-              <a:t>2/1/2023</a:t>
+              <a:t>23/02/2023</a:t>
             </a:fld>
             <a:endParaRPr lang="en-US"/>
           </a:p>
@@ -5007,7 +8107,7 @@
           <a:p>
             <a:fld id="{0653D66D-8F7F-4D89-96F6-686A96BDA468}" type="datetimeFigureOut">
               <a:rPr lang="en-US" smtClean="0"/>
-              <a:t>2/1/2023</a:t>
+              <a:t>23/02/2023</a:t>
             </a:fld>
             <a:endParaRPr lang="en-US"/>
           </a:p>
@@ -5102,7 +8202,7 @@
           <a:p>
             <a:fld id="{0653D66D-8F7F-4D89-96F6-686A96BDA468}" type="datetimeFigureOut">
               <a:rPr lang="en-US" smtClean="0"/>
-              <a:t>2/1/2023</a:t>
+              <a:t>23/02/2023</a:t>
             </a:fld>
             <a:endParaRPr lang="en-US"/>
           </a:p>
@@ -5357,7 +8457,7 @@
           <a:p>
             <a:fld id="{0653D66D-8F7F-4D89-96F6-686A96BDA468}" type="datetimeFigureOut">
               <a:rPr lang="en-US" smtClean="0"/>
-              <a:t>2/1/2023</a:t>
+              <a:t>23/02/2023</a:t>
             </a:fld>
             <a:endParaRPr lang="en-US"/>
           </a:p>
@@ -5657,7 +8757,7 @@
           <a:p>
             <a:fld id="{0653D66D-8F7F-4D89-96F6-686A96BDA468}" type="datetimeFigureOut">
               <a:rPr lang="en-US" smtClean="0"/>
-              <a:t>2/1/2023</a:t>
+              <a:t>23/02/2023</a:t>
             </a:fld>
             <a:endParaRPr lang="en-US"/>
           </a:p>
@@ -5891,7 +8991,7 @@
           <a:p>
             <a:fld id="{0653D66D-8F7F-4D89-96F6-686A96BDA468}" type="datetimeFigureOut">
               <a:rPr lang="en-US" smtClean="0"/>
-              <a:t>2/1/2023</a:t>
+              <a:t>23/02/2023</a:t>
             </a:fld>
             <a:endParaRPr lang="en-US"/>
           </a:p>
@@ -9178,9 +12278,20 @@
   <p:cSld>
     <p:bg>
       <p:bgPr>
-        <a:solidFill>
-          <a:schemeClr val="bg1"/>
-        </a:solidFill>
+        <a:blipFill rotWithShape="1">
+          <a:blip r:embed="rId2">
+            <a:duotone>
+              <a:schemeClr val="bg2">
+                <a:shade val="80000"/>
+                <a:lumMod val="80000"/>
+              </a:schemeClr>
+              <a:schemeClr val="bg2">
+                <a:tint val="98000"/>
+              </a:schemeClr>
+            </a:duotone>
+          </a:blip>
+          <a:stretch/>
+        </a:blipFill>
         <a:effectLst/>
       </p:bgPr>
     </p:bg>
@@ -9216,8 +12327,8 @@
         </p:nvSpPr>
         <p:spPr>
           <a:xfrm>
-            <a:off x="1102368" y="1877492"/>
-            <a:ext cx="4030132" cy="3215373"/>
+            <a:off x="633743" y="609599"/>
+            <a:ext cx="3413156" cy="5273675"/>
           </a:xfrm>
         </p:spPr>
         <p:txBody>
@@ -9226,118 +12337,92 @@
           </a:bodyPr>
           <a:lstStyle/>
           <a:p>
-            <a:pPr algn="ctr"/>
-            <a:r>
-              <a:rPr lang="en-US" b="0" i="0" dirty="0">
-                <a:solidFill>
-                  <a:schemeClr val="bg1"/>
-                </a:solidFill>
+            <a:r>
+              <a:rPr lang="en-US" b="0" i="0">
                 <a:effectLst/>
                 <a:latin typeface="Söhne"/>
               </a:rPr>
               <a:t>3.13 Introduction to PHP</a:t>
             </a:r>
-            <a:endParaRPr lang="en-US" dirty="0">
-              <a:solidFill>
-                <a:schemeClr val="bg1"/>
-              </a:solidFill>
-            </a:endParaRPr>
-          </a:p>
-        </p:txBody>
-      </p:sp>
-      <p:sp>
-        <p:nvSpPr>
-          <p:cNvPr id="11" name="Content Placeholder 2">
+            <a:endParaRPr lang="en-US"/>
+          </a:p>
+        </p:txBody>
+      </p:sp>
+      <p:pic>
+        <p:nvPicPr>
+          <p:cNvPr id="17" name="Picture 16">
             <a:extLst>
               <a:ext uri="{FF2B5EF4-FFF2-40B4-BE49-F238E27FC236}">
-                <a16:creationId xmlns:a16="http://schemas.microsoft.com/office/drawing/2014/main" id="{3B97A005-7444-43E5-0FD3-6D8196223115}"/>
+                <a16:creationId xmlns:a16="http://schemas.microsoft.com/office/drawing/2014/main" id="{82AABC82-C2D1-4340-A6DF-6E73DF06FCAC}"/>
+              </a:ext>
+              <a:ext uri="{C183D7F6-B498-43B3-948B-1728B52AA6E4}">
+                <adec:decorative xmlns:adec="http://schemas.microsoft.com/office/drawing/2017/decorative" val="1"/>
               </a:ext>
             </a:extLst>
           </p:cNvPr>
-          <p:cNvSpPr>
-            <a:spLocks noGrp="1"/>
-          </p:cNvSpPr>
-          <p:nvPr>
-            <p:ph idx="1"/>
-          </p:nvPr>
-        </p:nvSpPr>
+          <p:cNvPicPr>
+            <a:picLocks noGrp="1" noRot="1" noChangeAspect="1" noMove="1" noResize="1" noEditPoints="1" noAdjustHandles="1" noChangeArrowheads="1" noChangeShapeType="1" noCrop="1"/>
+          </p:cNvPicPr>
+          <p:nvPr>
+            <p:extLst>
+              <p:ext uri="{386F3935-93C4-4BCD-93E2-E3B085C9AB24}">
+                <p16:designElem xmlns:p16="http://schemas.microsoft.com/office/powerpoint/2015/main" val="1"/>
+              </p:ext>
+            </p:extLst>
+          </p:nvPr>
+        </p:nvPicPr>
+        <p:blipFill rotWithShape="1">
+          <a:blip r:embed="rId3">
+            <a:extLst>
+              <a:ext uri="{28A0092B-C50C-407E-A947-70E740481C1C}">
+                <a14:useLocalDpi xmlns:a14="http://schemas.microsoft.com/office/drawing/2010/main" val="0"/>
+              </a:ext>
+            </a:extLst>
+          </a:blip>
+          <a:srcRect t="964" r="2807" b="1446"/>
+          <a:stretch/>
+        </p:blipFill>
         <p:spPr>
           <a:xfrm>
-            <a:off x="6234868" y="1130846"/>
-            <a:ext cx="5217173" cy="4351338"/>
+            <a:off x="4639056" y="2"/>
+            <a:ext cx="7552944" cy="6857998"/>
           </a:xfrm>
+          <a:prstGeom prst="rect">
+            <a:avLst/>
+          </a:prstGeom>
         </p:spPr>
-        <p:txBody>
-          <a:bodyPr>
-            <a:normAutofit fontScale="92500"/>
-          </a:bodyPr>
-          <a:lstStyle/>
-          <a:p>
-            <a:pPr>
-              <a:buFont typeface="Arial" panose="020B0604020202020204" pitchFamily="34" charset="0"/>
-              <a:buChar char="•"/>
-            </a:pPr>
-            <a:r>
-              <a:rPr lang="en-US" sz="2600" b="0" i="0">
-                <a:solidFill>
-                  <a:schemeClr val="bg1"/>
-                </a:solidFill>
-                <a:effectLst/>
-                <a:latin typeface="Söhne"/>
-              </a:rPr>
-              <a:t>PHP stands for Hypertext Preprocessor</a:t>
-            </a:r>
-          </a:p>
-          <a:p>
-            <a:pPr>
-              <a:buFont typeface="Arial" panose="020B0604020202020204" pitchFamily="34" charset="0"/>
-              <a:buChar char="•"/>
-            </a:pPr>
-            <a:r>
-              <a:rPr lang="en-US" sz="2600" b="0" i="0">
-                <a:solidFill>
-                  <a:schemeClr val="bg1"/>
-                </a:solidFill>
-                <a:effectLst/>
-                <a:latin typeface="Söhne"/>
-              </a:rPr>
-              <a:t>It is a server-side scripting language used to create dynamic web pages</a:t>
-            </a:r>
-          </a:p>
-          <a:p>
-            <a:pPr>
-              <a:buFont typeface="Arial" panose="020B0604020202020204" pitchFamily="34" charset="0"/>
-              <a:buChar char="•"/>
-            </a:pPr>
-            <a:r>
-              <a:rPr lang="en-US" sz="2600" b="0" i="0">
-                <a:solidFill>
-                  <a:schemeClr val="bg1"/>
-                </a:solidFill>
-                <a:effectLst/>
-                <a:latin typeface="Söhne"/>
-              </a:rPr>
-              <a:t>PHP is widely used in web development and can be integrated with HTML, CSS, and JavaScript</a:t>
-            </a:r>
-          </a:p>
-          <a:p>
-            <a:pPr>
-              <a:buFont typeface="Arial" panose="020B0604020202020204" pitchFamily="34" charset="0"/>
-              <a:buChar char="•"/>
-            </a:pPr>
-            <a:r>
-              <a:rPr lang="en-US" sz="2600" b="0" i="0">
-                <a:solidFill>
-                  <a:schemeClr val="bg1"/>
-                </a:solidFill>
-                <a:effectLst/>
-                <a:latin typeface="Söhne"/>
-              </a:rPr>
-              <a:t>PHP code is executed on the server and the output is sent to the client's web browser</a:t>
-            </a:r>
-          </a:p>
-        </p:txBody>
-      </p:sp>
+      </p:pic>
+      <p:graphicFrame>
+        <p:nvGraphicFramePr>
+          <p:cNvPr id="13" name="Content Placeholder 2">
+            <a:extLst>
+              <a:ext uri="{FF2B5EF4-FFF2-40B4-BE49-F238E27FC236}">
+                <a16:creationId xmlns:a16="http://schemas.microsoft.com/office/drawing/2014/main" id="{B5AB7134-C640-2B08-07DB-B4410B764ACF}"/>
+              </a:ext>
+            </a:extLst>
+          </p:cNvPr>
+          <p:cNvGraphicFramePr>
+            <a:graphicFrameLocks noGrp="1"/>
+          </p:cNvGraphicFramePr>
+          <p:nvPr>
+            <p:ph idx="1"/>
+            <p:extLst>
+              <p:ext uri="{D42A27DB-BD31-4B8C-83A1-F6EECF244321}">
+                <p14:modId xmlns:p14="http://schemas.microsoft.com/office/powerpoint/2010/main" val="2862352812"/>
+              </p:ext>
+            </p:extLst>
+          </p:nvPr>
+        </p:nvGraphicFramePr>
+        <p:xfrm>
+          <a:off x="5282521" y="709683"/>
+          <a:ext cx="6266011" cy="4899547"/>
+        </p:xfrm>
+        <a:graphic>
+          <a:graphicData uri="http://schemas.openxmlformats.org/drawingml/2006/diagram">
+            <dgm:relIds xmlns:dgm="http://schemas.openxmlformats.org/drawingml/2006/diagram" xmlns:r="http://schemas.openxmlformats.org/officeDocument/2006/relationships" r:dm="rId4" r:lo="rId5" r:qs="rId6" r:cs="rId7"/>
+          </a:graphicData>
+        </a:graphic>
+      </p:graphicFrame>
     </p:spTree>
     <p:extLst>
       <p:ext uri="{BB962C8B-B14F-4D97-AF65-F5344CB8AC3E}">
@@ -11110,9 +14195,20 @@
   <p:cSld>
     <p:bg>
       <p:bgPr>
-        <a:solidFill>
-          <a:schemeClr val="bg1"/>
-        </a:solidFill>
+        <a:blipFill rotWithShape="1">
+          <a:blip r:embed="rId2">
+            <a:duotone>
+              <a:schemeClr val="bg2">
+                <a:shade val="80000"/>
+                <a:lumMod val="80000"/>
+              </a:schemeClr>
+              <a:schemeClr val="bg2">
+                <a:tint val="98000"/>
+              </a:schemeClr>
+            </a:duotone>
+          </a:blip>
+          <a:stretch/>
+        </a:blipFill>
         <a:effectLst/>
       </p:bgPr>
     </p:bg>
@@ -11130,6 +14226,139 @@
           <a:chExt cx="0" cy="0"/>
         </a:xfrm>
       </p:grpSpPr>
+      <p:sp useBgFill="1">
+        <p:nvSpPr>
+          <p:cNvPr id="16" name="Rectangle 15">
+            <a:extLst>
+              <a:ext uri="{FF2B5EF4-FFF2-40B4-BE49-F238E27FC236}">
+                <a16:creationId xmlns:a16="http://schemas.microsoft.com/office/drawing/2014/main" id="{69652D62-ECFB-408E-ABE6-155A644F433D}"/>
+              </a:ext>
+              <a:ext uri="{C183D7F6-B498-43B3-948B-1728B52AA6E4}">
+                <adec:decorative xmlns:adec="http://schemas.microsoft.com/office/drawing/2017/decorative" val="1"/>
+              </a:ext>
+            </a:extLst>
+          </p:cNvPr>
+          <p:cNvSpPr>
+            <a:spLocks noGrp="1" noRot="1" noChangeAspect="1" noMove="1" noResize="1" noEditPoints="1" noAdjustHandles="1" noChangeArrowheads="1" noChangeShapeType="1" noTextEdit="1"/>
+          </p:cNvSpPr>
+          <p:nvPr>
+            <p:extLst>
+              <p:ext uri="{386F3935-93C4-4BCD-93E2-E3B085C9AB24}">
+                <p16:designElem xmlns:p16="http://schemas.microsoft.com/office/powerpoint/2015/main" val="1"/>
+              </p:ext>
+            </p:extLst>
+          </p:nvPr>
+        </p:nvSpPr>
+        <p:spPr>
+          <a:xfrm>
+            <a:off x="0" y="0"/>
+            <a:ext cx="12192000" cy="6858000"/>
+          </a:xfrm>
+          <a:prstGeom prst="rect">
+            <a:avLst/>
+          </a:prstGeom>
+          <a:ln>
+            <a:noFill/>
+          </a:ln>
+        </p:spPr>
+        <p:style>
+          <a:lnRef idx="2">
+            <a:schemeClr val="accent1">
+              <a:shade val="50000"/>
+            </a:schemeClr>
+          </a:lnRef>
+          <a:fillRef idx="1">
+            <a:schemeClr val="accent1"/>
+          </a:fillRef>
+          <a:effectRef idx="0">
+            <a:schemeClr val="accent1"/>
+          </a:effectRef>
+          <a:fontRef idx="minor">
+            <a:schemeClr val="lt1"/>
+          </a:fontRef>
+        </p:style>
+        <p:txBody>
+          <a:bodyPr rtlCol="0" anchor="ctr"/>
+          <a:lstStyle/>
+          <a:p>
+            <a:pPr algn="ctr"/>
+            <a:endParaRPr lang="en-US"/>
+          </a:p>
+        </p:txBody>
+      </p:sp>
+      <p:sp>
+        <p:nvSpPr>
+          <p:cNvPr id="18" name="Rectangle 17">
+            <a:extLst>
+              <a:ext uri="{FF2B5EF4-FFF2-40B4-BE49-F238E27FC236}">
+                <a16:creationId xmlns:a16="http://schemas.microsoft.com/office/drawing/2014/main" id="{C1FEA985-924B-4044-8778-32D1E7164C01}"/>
+              </a:ext>
+              <a:ext uri="{C183D7F6-B498-43B3-948B-1728B52AA6E4}">
+                <adec:decorative xmlns:adec="http://schemas.microsoft.com/office/drawing/2017/decorative" val="1"/>
+              </a:ext>
+            </a:extLst>
+          </p:cNvPr>
+          <p:cNvSpPr>
+            <a:spLocks noGrp="1" noRot="1" noChangeAspect="1" noMove="1" noResize="1" noEditPoints="1" noAdjustHandles="1" noChangeArrowheads="1" noChangeShapeType="1" noTextEdit="1"/>
+          </p:cNvSpPr>
+          <p:nvPr>
+            <p:extLst>
+              <p:ext uri="{386F3935-93C4-4BCD-93E2-E3B085C9AB24}">
+                <p16:designElem xmlns:p16="http://schemas.microsoft.com/office/powerpoint/2015/main" val="1"/>
+              </p:ext>
+            </p:extLst>
+          </p:nvPr>
+        </p:nvSpPr>
+        <p:spPr bwMode="ltGray">
+          <a:xfrm>
+            <a:off x="321564" y="320040"/>
+            <a:ext cx="11548872" cy="6217920"/>
+          </a:xfrm>
+          <a:prstGeom prst="rect">
+            <a:avLst/>
+          </a:prstGeom>
+          <a:solidFill>
+            <a:schemeClr val="bg1">
+              <a:lumMod val="75000"/>
+              <a:lumOff val="25000"/>
+            </a:schemeClr>
+          </a:solidFill>
+          <a:ln>
+            <a:noFill/>
+          </a:ln>
+          <a:effectLst>
+            <a:innerShdw blurRad="63500" dist="50800" dir="16200000">
+              <a:prstClr val="black">
+                <a:alpha val="50000"/>
+              </a:prstClr>
+            </a:innerShdw>
+          </a:effectLst>
+        </p:spPr>
+        <p:style>
+          <a:lnRef idx="2">
+            <a:schemeClr val="accent1">
+              <a:shade val="50000"/>
+            </a:schemeClr>
+          </a:lnRef>
+          <a:fillRef idx="1">
+            <a:schemeClr val="accent1"/>
+          </a:fillRef>
+          <a:effectRef idx="0">
+            <a:schemeClr val="accent1"/>
+          </a:effectRef>
+          <a:fontRef idx="minor">
+            <a:schemeClr val="lt1"/>
+          </a:fontRef>
+        </p:style>
+        <p:txBody>
+          <a:bodyPr rtlCol="0" anchor="ctr"/>
+          <a:lstStyle/>
+          <a:p>
+            <a:pPr algn="ctr"/>
+            <a:endParaRPr lang="en-US"/>
+          </a:p>
+        </p:txBody>
+      </p:sp>
       <p:sp>
         <p:nvSpPr>
           <p:cNvPr id="2" name="Title 1">
@@ -11148,8 +14377,8 @@
         </p:nvSpPr>
         <p:spPr>
           <a:xfrm>
-            <a:off x="1102368" y="1877492"/>
-            <a:ext cx="4030132" cy="3215373"/>
+            <a:off x="913795" y="963506"/>
+            <a:ext cx="3740815" cy="4827693"/>
           </a:xfrm>
         </p:spPr>
         <p:txBody>
@@ -11158,25 +14387,70 @@
           </a:bodyPr>
           <a:lstStyle/>
           <a:p>
-            <a:pPr algn="ctr"/>
+            <a:pPr algn="r"/>
             <a:r>
               <a:rPr lang="en-US" b="0" i="0">
-                <a:solidFill>
-                  <a:schemeClr val="bg1"/>
-                </a:solidFill>
                 <a:effectLst/>
                 <a:latin typeface="Söhne"/>
               </a:rPr>
               <a:t>3.13 Hardware and Software Requirements</a:t>
             </a:r>
-            <a:endParaRPr lang="en-US" dirty="0">
-              <a:solidFill>
-                <a:schemeClr val="bg1"/>
-              </a:solidFill>
-            </a:endParaRPr>
-          </a:p>
-        </p:txBody>
-      </p:sp>
+            <a:endParaRPr lang="en-US"/>
+          </a:p>
+        </p:txBody>
+      </p:sp>
+      <p:cxnSp>
+        <p:nvCxnSpPr>
+          <p:cNvPr id="20" name="Straight Connector 19">
+            <a:extLst>
+              <a:ext uri="{FF2B5EF4-FFF2-40B4-BE49-F238E27FC236}">
+                <a16:creationId xmlns:a16="http://schemas.microsoft.com/office/drawing/2014/main" id="{96C7F9CB-BCC3-4648-8DEF-07B0887D87D6}"/>
+              </a:ext>
+              <a:ext uri="{C183D7F6-B498-43B3-948B-1728B52AA6E4}">
+                <adec:decorative xmlns:adec="http://schemas.microsoft.com/office/drawing/2017/decorative" val="1"/>
+              </a:ext>
+            </a:extLst>
+          </p:cNvPr>
+          <p:cNvCxnSpPr>
+            <a:cxnSpLocks noGrp="1" noRot="1" noChangeAspect="1" noMove="1" noResize="1" noEditPoints="1" noAdjustHandles="1" noChangeArrowheads="1" noChangeShapeType="1"/>
+          </p:cNvCxnSpPr>
+          <p:nvPr>
+            <p:extLst>
+              <p:ext uri="{386F3935-93C4-4BCD-93E2-E3B085C9AB24}">
+                <p16:designElem xmlns:p16="http://schemas.microsoft.com/office/powerpoint/2015/main" val="1"/>
+              </p:ext>
+            </p:extLst>
+          </p:nvPr>
+        </p:nvCxnSpPr>
+        <p:spPr>
+          <a:xfrm>
+            <a:off x="4981187" y="2057399"/>
+            <a:ext cx="0" cy="2743200"/>
+          </a:xfrm>
+          <a:prstGeom prst="line">
+            <a:avLst/>
+          </a:prstGeom>
+          <a:ln w="19050">
+            <a:solidFill>
+              <a:schemeClr val="accent1"/>
+            </a:solidFill>
+          </a:ln>
+        </p:spPr>
+        <p:style>
+          <a:lnRef idx="1">
+            <a:schemeClr val="accent1"/>
+          </a:lnRef>
+          <a:fillRef idx="0">
+            <a:schemeClr val="accent1"/>
+          </a:fillRef>
+          <a:effectRef idx="0">
+            <a:schemeClr val="accent1"/>
+          </a:effectRef>
+          <a:fontRef idx="minor">
+            <a:schemeClr val="tx1"/>
+          </a:fontRef>
+        </p:style>
+      </p:cxnSp>
       <p:sp>
         <p:nvSpPr>
           <p:cNvPr id="11" name="Content Placeholder 2">
@@ -11195,13 +14469,14 @@
         </p:nvSpPr>
         <p:spPr>
           <a:xfrm>
-            <a:off x="6234868" y="1130846"/>
-            <a:ext cx="5217173" cy="4351338"/>
+            <a:off x="5307765" y="963507"/>
+            <a:ext cx="5959791" cy="4827694"/>
           </a:xfrm>
+          <a:effectLst/>
         </p:spPr>
         <p:txBody>
-          <a:bodyPr>
-            <a:normAutofit lnSpcReduction="10000"/>
+          <a:bodyPr anchor="ctr">
+            <a:normAutofit/>
           </a:bodyPr>
           <a:lstStyle/>
           <a:p>
@@ -11210,9 +14485,9 @@
               <a:buChar char="•"/>
             </a:pPr>
             <a:r>
-              <a:rPr lang="en-US" sz="2200" b="0" i="0">
+              <a:rPr lang="en-US" b="0" i="0">
                 <a:solidFill>
-                  <a:schemeClr val="bg1"/>
+                  <a:schemeClr val="tx1"/>
                 </a:solidFill>
                 <a:effectLst/>
                 <a:latin typeface="Söhne"/>
@@ -11226,9 +14501,9 @@
               <a:buChar char="•"/>
             </a:pPr>
             <a:r>
-              <a:rPr lang="en-US" sz="2200" b="0" i="0">
+              <a:rPr lang="en-US" b="0" i="0">
                 <a:solidFill>
-                  <a:schemeClr val="bg1"/>
+                  <a:schemeClr val="tx1"/>
                 </a:solidFill>
                 <a:effectLst/>
                 <a:latin typeface="Söhne"/>
@@ -11242,9 +14517,9 @@
               <a:buChar char="•"/>
             </a:pPr>
             <a:r>
-              <a:rPr lang="en-US" sz="2200" b="0" i="0">
+              <a:rPr lang="en-US" b="0" i="0">
                 <a:solidFill>
-                  <a:schemeClr val="bg1"/>
+                  <a:schemeClr val="tx1"/>
                 </a:solidFill>
                 <a:effectLst/>
                 <a:latin typeface="Söhne"/>
@@ -11258,9 +14533,9 @@
               <a:buChar char="•"/>
             </a:pPr>
             <a:r>
-              <a:rPr lang="en-US" sz="2200" b="0" i="0">
+              <a:rPr lang="en-US" b="0" i="0">
                 <a:solidFill>
-                  <a:schemeClr val="bg1"/>
+                  <a:schemeClr val="tx1"/>
                 </a:solidFill>
                 <a:effectLst/>
                 <a:latin typeface="Söhne"/>
@@ -11274,9 +14549,9 @@
               <a:buChar char="•"/>
             </a:pPr>
             <a:r>
-              <a:rPr lang="en-US" sz="2200" b="0" i="0">
+              <a:rPr lang="en-US" b="0" i="0">
                 <a:solidFill>
-                  <a:schemeClr val="bg1"/>
+                  <a:schemeClr val="tx1"/>
                 </a:solidFill>
                 <a:effectLst/>
                 <a:latin typeface="Söhne"/>

</xml_diff>